<commit_message>
First draft of issues section.
</commit_message>
<xml_diff>
--- a/papers/melo2016/images/images.pptx
+++ b/papers/melo2016/images/images.pptx
@@ -6,6 +6,7 @@
   </p:sldMasterIdLst>
   <p:sldIdLst>
     <p:sldId id="256" r:id="rId2"/>
+    <p:sldId id="257" r:id="rId3"/>
   </p:sldIdLst>
   <p:sldSz cx="12192000" cy="6858000"/>
   <p:notesSz cx="6858000" cy="9144000"/>
@@ -243,7 +244,7 @@
           <a:p>
             <a:fld id="{687EA437-938E-4D8A-B46E-0DAB5A148C97}" type="datetimeFigureOut">
               <a:rPr lang="en-GB" smtClean="0"/>
-              <a:t>19/04/2016</a:t>
+              <a:t>20/04/2016</a:t>
             </a:fld>
             <a:endParaRPr lang="en-GB"/>
           </a:p>
@@ -413,7 +414,7 @@
           <a:p>
             <a:fld id="{687EA437-938E-4D8A-B46E-0DAB5A148C97}" type="datetimeFigureOut">
               <a:rPr lang="en-GB" smtClean="0"/>
-              <a:t>19/04/2016</a:t>
+              <a:t>20/04/2016</a:t>
             </a:fld>
             <a:endParaRPr lang="en-GB"/>
           </a:p>
@@ -593,7 +594,7 @@
           <a:p>
             <a:fld id="{687EA437-938E-4D8A-B46E-0DAB5A148C97}" type="datetimeFigureOut">
               <a:rPr lang="en-GB" smtClean="0"/>
-              <a:t>19/04/2016</a:t>
+              <a:t>20/04/2016</a:t>
             </a:fld>
             <a:endParaRPr lang="en-GB"/>
           </a:p>
@@ -763,7 +764,7 @@
           <a:p>
             <a:fld id="{687EA437-938E-4D8A-B46E-0DAB5A148C97}" type="datetimeFigureOut">
               <a:rPr lang="en-GB" smtClean="0"/>
-              <a:t>19/04/2016</a:t>
+              <a:t>20/04/2016</a:t>
             </a:fld>
             <a:endParaRPr lang="en-GB"/>
           </a:p>
@@ -1009,7 +1010,7 @@
           <a:p>
             <a:fld id="{687EA437-938E-4D8A-B46E-0DAB5A148C97}" type="datetimeFigureOut">
               <a:rPr lang="en-GB" smtClean="0"/>
-              <a:t>19/04/2016</a:t>
+              <a:t>20/04/2016</a:t>
             </a:fld>
             <a:endParaRPr lang="en-GB"/>
           </a:p>
@@ -1241,7 +1242,7 @@
           <a:p>
             <a:fld id="{687EA437-938E-4D8A-B46E-0DAB5A148C97}" type="datetimeFigureOut">
               <a:rPr lang="en-GB" smtClean="0"/>
-              <a:t>19/04/2016</a:t>
+              <a:t>20/04/2016</a:t>
             </a:fld>
             <a:endParaRPr lang="en-GB"/>
           </a:p>
@@ -1608,7 +1609,7 @@
           <a:p>
             <a:fld id="{687EA437-938E-4D8A-B46E-0DAB5A148C97}" type="datetimeFigureOut">
               <a:rPr lang="en-GB" smtClean="0"/>
-              <a:t>19/04/2016</a:t>
+              <a:t>20/04/2016</a:t>
             </a:fld>
             <a:endParaRPr lang="en-GB"/>
           </a:p>
@@ -1726,7 +1727,7 @@
           <a:p>
             <a:fld id="{687EA437-938E-4D8A-B46E-0DAB5A148C97}" type="datetimeFigureOut">
               <a:rPr lang="en-GB" smtClean="0"/>
-              <a:t>19/04/2016</a:t>
+              <a:t>20/04/2016</a:t>
             </a:fld>
             <a:endParaRPr lang="en-GB"/>
           </a:p>
@@ -1821,7 +1822,7 @@
           <a:p>
             <a:fld id="{687EA437-938E-4D8A-B46E-0DAB5A148C97}" type="datetimeFigureOut">
               <a:rPr lang="en-GB" smtClean="0"/>
-              <a:t>19/04/2016</a:t>
+              <a:t>20/04/2016</a:t>
             </a:fld>
             <a:endParaRPr lang="en-GB"/>
           </a:p>
@@ -2098,7 +2099,7 @@
           <a:p>
             <a:fld id="{687EA437-938E-4D8A-B46E-0DAB5A148C97}" type="datetimeFigureOut">
               <a:rPr lang="en-GB" smtClean="0"/>
-              <a:t>19/04/2016</a:t>
+              <a:t>20/04/2016</a:t>
             </a:fld>
             <a:endParaRPr lang="en-GB"/>
           </a:p>
@@ -2351,7 +2352,7 @@
           <a:p>
             <a:fld id="{687EA437-938E-4D8A-B46E-0DAB5A148C97}" type="datetimeFigureOut">
               <a:rPr lang="en-GB" smtClean="0"/>
-              <a:t>19/04/2016</a:t>
+              <a:t>20/04/2016</a:t>
             </a:fld>
             <a:endParaRPr lang="en-GB"/>
           </a:p>
@@ -2564,7 +2565,7 @@
           <a:p>
             <a:fld id="{687EA437-938E-4D8A-B46E-0DAB5A148C97}" type="datetimeFigureOut">
               <a:rPr lang="en-GB" smtClean="0"/>
-              <a:t>19/04/2016</a:t>
+              <a:t>20/04/2016</a:t>
             </a:fld>
             <a:endParaRPr lang="en-GB"/>
           </a:p>
@@ -2977,7 +2978,7 @@
         </p:nvGrpSpPr>
         <p:grpSpPr>
           <a:xfrm>
-            <a:off x="967570" y="489632"/>
+            <a:off x="411332" y="353855"/>
             <a:ext cx="6955518" cy="1746123"/>
             <a:chOff x="2845168" y="2728808"/>
             <a:chExt cx="6955518" cy="1746123"/>
@@ -3910,7 +3911,7 @@
           </p:nvSpPr>
           <p:spPr>
             <a:xfrm>
-              <a:off x="8336755" y="3488651"/>
+              <a:off x="8591196" y="3504553"/>
               <a:ext cx="399431" cy="432792"/>
             </a:xfrm>
             <a:prstGeom prst="ellipse">
@@ -3983,16 +3984,4060 @@
           </p:txBody>
         </p:sp>
       </p:grpSp>
+      <p:grpSp>
+        <p:nvGrpSpPr>
+          <p:cNvPr id="104" name="Group 103"/>
+          <p:cNvGrpSpPr/>
+          <p:nvPr/>
+        </p:nvGrpSpPr>
+        <p:grpSpPr>
+          <a:xfrm>
+            <a:off x="3033363" y="4841802"/>
+            <a:ext cx="3115203" cy="694896"/>
+            <a:chOff x="7923088" y="2988531"/>
+            <a:chExt cx="3115203" cy="694896"/>
+          </a:xfrm>
+        </p:grpSpPr>
+        <p:grpSp>
+          <p:nvGrpSpPr>
+            <p:cNvPr id="98" name="Group 97"/>
+            <p:cNvGrpSpPr/>
+            <p:nvPr/>
+          </p:nvGrpSpPr>
+          <p:grpSpPr>
+            <a:xfrm>
+              <a:off x="7923088" y="3311159"/>
+              <a:ext cx="3115203" cy="372268"/>
+              <a:chOff x="7923088" y="3311159"/>
+              <a:chExt cx="3115203" cy="372268"/>
+            </a:xfrm>
+          </p:grpSpPr>
+          <p:sp>
+            <p:nvSpPr>
+              <p:cNvPr id="80" name="TextBox 79"/>
+              <p:cNvSpPr txBox="1"/>
+              <p:nvPr/>
+            </p:nvSpPr>
+            <p:spPr>
+              <a:xfrm>
+                <a:off x="7923088" y="3312627"/>
+                <a:ext cx="3115203" cy="369332"/>
+              </a:xfrm>
+              <a:prstGeom prst="rect">
+                <a:avLst/>
+              </a:prstGeom>
+              <a:ln w="19050"/>
+              <a:effectLst>
+                <a:outerShdw blurRad="50800" dist="38100" dir="2700000" algn="tl" rotWithShape="0">
+                  <a:prstClr val="black">
+                    <a:alpha val="40000"/>
+                  </a:prstClr>
+                </a:outerShdw>
+              </a:effectLst>
+            </p:spPr>
+            <p:style>
+              <a:lnRef idx="2">
+                <a:schemeClr val="dk1"/>
+              </a:lnRef>
+              <a:fillRef idx="1">
+                <a:schemeClr val="lt1"/>
+              </a:fillRef>
+              <a:effectRef idx="0">
+                <a:schemeClr val="dk1"/>
+              </a:effectRef>
+              <a:fontRef idx="minor">
+                <a:schemeClr val="dk1"/>
+              </a:fontRef>
+            </p:style>
+            <p:txBody>
+              <a:bodyPr wrap="none" lIns="36000" rIns="36000" rtlCol="0">
+                <a:spAutoFit/>
+              </a:bodyPr>
+              <a:lstStyle/>
+              <a:p>
+                <a:r>
+                  <a:rPr lang="en-GB" dirty="0" smtClean="0"/>
+                  <a:t>21121100011523202112121122</a:t>
+                </a:r>
+                <a:endParaRPr lang="en-GB" dirty="0"/>
+              </a:p>
+            </p:txBody>
+          </p:sp>
+          <p:cxnSp>
+            <p:nvCxnSpPr>
+              <p:cNvPr id="82" name="Straight Connector 81"/>
+              <p:cNvCxnSpPr/>
+              <p:nvPr/>
+            </p:nvCxnSpPr>
+            <p:spPr>
+              <a:xfrm>
+                <a:off x="8540771" y="3312627"/>
+                <a:ext cx="0" cy="370800"/>
+              </a:xfrm>
+              <a:prstGeom prst="line">
+                <a:avLst/>
+              </a:prstGeom>
+              <a:ln w="19050">
+                <a:solidFill>
+                  <a:schemeClr val="tx1"/>
+                </a:solidFill>
+              </a:ln>
+            </p:spPr>
+            <p:style>
+              <a:lnRef idx="1">
+                <a:schemeClr val="accent1"/>
+              </a:lnRef>
+              <a:fillRef idx="0">
+                <a:schemeClr val="accent1"/>
+              </a:fillRef>
+              <a:effectRef idx="0">
+                <a:schemeClr val="accent1"/>
+              </a:effectRef>
+              <a:fontRef idx="minor">
+                <a:schemeClr val="tx1"/>
+              </a:fontRef>
+            </p:style>
+          </p:cxnSp>
+          <p:cxnSp>
+            <p:nvCxnSpPr>
+              <p:cNvPr id="83" name="Straight Connector 82"/>
+              <p:cNvCxnSpPr/>
+              <p:nvPr/>
+            </p:nvCxnSpPr>
+            <p:spPr>
+              <a:xfrm>
+                <a:off x="9578853" y="3311159"/>
+                <a:ext cx="0" cy="370800"/>
+              </a:xfrm>
+              <a:prstGeom prst="line">
+                <a:avLst/>
+              </a:prstGeom>
+              <a:ln w="19050">
+                <a:solidFill>
+                  <a:schemeClr val="tx1"/>
+                </a:solidFill>
+              </a:ln>
+            </p:spPr>
+            <p:style>
+              <a:lnRef idx="1">
+                <a:schemeClr val="accent1"/>
+              </a:lnRef>
+              <a:fillRef idx="0">
+                <a:schemeClr val="accent1"/>
+              </a:fillRef>
+              <a:effectRef idx="0">
+                <a:schemeClr val="accent1"/>
+              </a:effectRef>
+              <a:fontRef idx="minor">
+                <a:schemeClr val="tx1"/>
+              </a:fontRef>
+            </p:style>
+          </p:cxnSp>
+          <p:cxnSp>
+            <p:nvCxnSpPr>
+              <p:cNvPr id="84" name="Straight Connector 83"/>
+              <p:cNvCxnSpPr/>
+              <p:nvPr/>
+            </p:nvCxnSpPr>
+            <p:spPr>
+              <a:xfrm>
+                <a:off x="10392726" y="3311159"/>
+                <a:ext cx="0" cy="370800"/>
+              </a:xfrm>
+              <a:prstGeom prst="line">
+                <a:avLst/>
+              </a:prstGeom>
+              <a:ln w="19050">
+                <a:solidFill>
+                  <a:schemeClr val="tx1"/>
+                </a:solidFill>
+              </a:ln>
+            </p:spPr>
+            <p:style>
+              <a:lnRef idx="1">
+                <a:schemeClr val="accent1"/>
+              </a:lnRef>
+              <a:fillRef idx="0">
+                <a:schemeClr val="accent1"/>
+              </a:fillRef>
+              <a:effectRef idx="0">
+                <a:schemeClr val="accent1"/>
+              </a:effectRef>
+              <a:fontRef idx="minor">
+                <a:schemeClr val="tx1"/>
+              </a:fontRef>
+            </p:style>
+          </p:cxnSp>
+          <p:cxnSp>
+            <p:nvCxnSpPr>
+              <p:cNvPr id="86" name="Straight Connector 85"/>
+              <p:cNvCxnSpPr/>
+              <p:nvPr/>
+            </p:nvCxnSpPr>
+            <p:spPr>
+              <a:xfrm>
+                <a:off x="8075654" y="3312627"/>
+                <a:ext cx="0" cy="370800"/>
+              </a:xfrm>
+              <a:prstGeom prst="line">
+                <a:avLst/>
+              </a:prstGeom>
+              <a:ln w="9525">
+                <a:solidFill>
+                  <a:schemeClr val="tx1"/>
+                </a:solidFill>
+                <a:prstDash val="dash"/>
+              </a:ln>
+            </p:spPr>
+            <p:style>
+              <a:lnRef idx="1">
+                <a:schemeClr val="accent1"/>
+              </a:lnRef>
+              <a:fillRef idx="0">
+                <a:schemeClr val="accent1"/>
+              </a:fillRef>
+              <a:effectRef idx="0">
+                <a:schemeClr val="accent1"/>
+              </a:effectRef>
+              <a:fontRef idx="minor">
+                <a:schemeClr val="tx1"/>
+              </a:fontRef>
+            </p:style>
+          </p:cxnSp>
+          <p:cxnSp>
+            <p:nvCxnSpPr>
+              <p:cNvPr id="87" name="Straight Connector 86"/>
+              <p:cNvCxnSpPr/>
+              <p:nvPr/>
+            </p:nvCxnSpPr>
+            <p:spPr>
+              <a:xfrm>
+                <a:off x="8309017" y="3312627"/>
+                <a:ext cx="0" cy="370800"/>
+              </a:xfrm>
+              <a:prstGeom prst="line">
+                <a:avLst/>
+              </a:prstGeom>
+              <a:ln w="9525">
+                <a:solidFill>
+                  <a:schemeClr val="tx1"/>
+                </a:solidFill>
+                <a:prstDash val="dash"/>
+              </a:ln>
+            </p:spPr>
+            <p:style>
+              <a:lnRef idx="1">
+                <a:schemeClr val="accent1"/>
+              </a:lnRef>
+              <a:fillRef idx="0">
+                <a:schemeClr val="accent1"/>
+              </a:fillRef>
+              <a:effectRef idx="0">
+                <a:schemeClr val="accent1"/>
+              </a:effectRef>
+              <a:fontRef idx="minor">
+                <a:schemeClr val="tx1"/>
+              </a:fontRef>
+            </p:style>
+          </p:cxnSp>
+          <p:cxnSp>
+            <p:nvCxnSpPr>
+              <p:cNvPr id="88" name="Straight Connector 87"/>
+              <p:cNvCxnSpPr/>
+              <p:nvPr/>
+            </p:nvCxnSpPr>
+            <p:spPr>
+              <a:xfrm>
+                <a:off x="8648741" y="3312627"/>
+                <a:ext cx="0" cy="370800"/>
+              </a:xfrm>
+              <a:prstGeom prst="line">
+                <a:avLst/>
+              </a:prstGeom>
+              <a:ln w="9525">
+                <a:solidFill>
+                  <a:schemeClr val="tx1"/>
+                </a:solidFill>
+                <a:prstDash val="dash"/>
+              </a:ln>
+            </p:spPr>
+            <p:style>
+              <a:lnRef idx="1">
+                <a:schemeClr val="accent1"/>
+              </a:lnRef>
+              <a:fillRef idx="0">
+                <a:schemeClr val="accent1"/>
+              </a:fillRef>
+              <a:effectRef idx="0">
+                <a:schemeClr val="accent1"/>
+              </a:effectRef>
+              <a:fontRef idx="minor">
+                <a:schemeClr val="tx1"/>
+              </a:fontRef>
+            </p:style>
+          </p:cxnSp>
+          <p:cxnSp>
+            <p:nvCxnSpPr>
+              <p:cNvPr id="89" name="Straight Connector 88"/>
+              <p:cNvCxnSpPr/>
+              <p:nvPr/>
+            </p:nvCxnSpPr>
+            <p:spPr>
+              <a:xfrm>
+                <a:off x="8885279" y="3312627"/>
+                <a:ext cx="0" cy="370800"/>
+              </a:xfrm>
+              <a:prstGeom prst="line">
+                <a:avLst/>
+              </a:prstGeom>
+              <a:ln w="9525">
+                <a:solidFill>
+                  <a:schemeClr val="tx1"/>
+                </a:solidFill>
+                <a:prstDash val="dash"/>
+              </a:ln>
+            </p:spPr>
+            <p:style>
+              <a:lnRef idx="1">
+                <a:schemeClr val="accent1"/>
+              </a:lnRef>
+              <a:fillRef idx="0">
+                <a:schemeClr val="accent1"/>
+              </a:fillRef>
+              <a:effectRef idx="0">
+                <a:schemeClr val="accent1"/>
+              </a:effectRef>
+              <a:fontRef idx="minor">
+                <a:schemeClr val="tx1"/>
+              </a:fontRef>
+            </p:style>
+          </p:cxnSp>
+          <p:cxnSp>
+            <p:nvCxnSpPr>
+              <p:cNvPr id="90" name="Straight Connector 89"/>
+              <p:cNvCxnSpPr/>
+              <p:nvPr/>
+            </p:nvCxnSpPr>
+            <p:spPr>
+              <a:xfrm>
+                <a:off x="9116260" y="3312627"/>
+                <a:ext cx="0" cy="370800"/>
+              </a:xfrm>
+              <a:prstGeom prst="line">
+                <a:avLst/>
+              </a:prstGeom>
+              <a:ln w="9525">
+                <a:solidFill>
+                  <a:schemeClr val="tx1"/>
+                </a:solidFill>
+                <a:prstDash val="dash"/>
+              </a:ln>
+            </p:spPr>
+            <p:style>
+              <a:lnRef idx="1">
+                <a:schemeClr val="accent1"/>
+              </a:lnRef>
+              <a:fillRef idx="0">
+                <a:schemeClr val="accent1"/>
+              </a:fillRef>
+              <a:effectRef idx="0">
+                <a:schemeClr val="accent1"/>
+              </a:effectRef>
+              <a:fontRef idx="minor">
+                <a:schemeClr val="tx1"/>
+              </a:fontRef>
+            </p:style>
+          </p:cxnSp>
+          <p:cxnSp>
+            <p:nvCxnSpPr>
+              <p:cNvPr id="91" name="Straight Connector 90"/>
+              <p:cNvCxnSpPr/>
+              <p:nvPr/>
+            </p:nvCxnSpPr>
+            <p:spPr>
+              <a:xfrm>
+                <a:off x="9346447" y="3311159"/>
+                <a:ext cx="0" cy="370800"/>
+              </a:xfrm>
+              <a:prstGeom prst="line">
+                <a:avLst/>
+              </a:prstGeom>
+              <a:ln w="9525">
+                <a:solidFill>
+                  <a:schemeClr val="tx1"/>
+                </a:solidFill>
+                <a:prstDash val="dash"/>
+              </a:ln>
+            </p:spPr>
+            <p:style>
+              <a:lnRef idx="1">
+                <a:schemeClr val="accent1"/>
+              </a:lnRef>
+              <a:fillRef idx="0">
+                <a:schemeClr val="accent1"/>
+              </a:fillRef>
+              <a:effectRef idx="0">
+                <a:schemeClr val="accent1"/>
+              </a:effectRef>
+              <a:fontRef idx="minor">
+                <a:schemeClr val="tx1"/>
+              </a:fontRef>
+            </p:style>
+          </p:cxnSp>
+          <p:cxnSp>
+            <p:nvCxnSpPr>
+              <p:cNvPr id="92" name="Straight Connector 91"/>
+              <p:cNvCxnSpPr/>
+              <p:nvPr/>
+            </p:nvCxnSpPr>
+            <p:spPr>
+              <a:xfrm>
+                <a:off x="9692522" y="3312627"/>
+                <a:ext cx="0" cy="370800"/>
+              </a:xfrm>
+              <a:prstGeom prst="line">
+                <a:avLst/>
+              </a:prstGeom>
+              <a:ln w="9525">
+                <a:solidFill>
+                  <a:schemeClr val="tx1"/>
+                </a:solidFill>
+                <a:prstDash val="dash"/>
+              </a:ln>
+            </p:spPr>
+            <p:style>
+              <a:lnRef idx="1">
+                <a:schemeClr val="accent1"/>
+              </a:lnRef>
+              <a:fillRef idx="0">
+                <a:schemeClr val="accent1"/>
+              </a:fillRef>
+              <a:effectRef idx="0">
+                <a:schemeClr val="accent1"/>
+              </a:effectRef>
+              <a:fontRef idx="minor">
+                <a:schemeClr val="tx1"/>
+              </a:fontRef>
+            </p:style>
+          </p:cxnSp>
+          <p:cxnSp>
+            <p:nvCxnSpPr>
+              <p:cNvPr id="93" name="Straight Connector 92"/>
+              <p:cNvCxnSpPr/>
+              <p:nvPr/>
+            </p:nvCxnSpPr>
+            <p:spPr>
+              <a:xfrm>
+                <a:off x="9928266" y="3312627"/>
+                <a:ext cx="0" cy="370800"/>
+              </a:xfrm>
+              <a:prstGeom prst="line">
+                <a:avLst/>
+              </a:prstGeom>
+              <a:ln w="9525">
+                <a:solidFill>
+                  <a:schemeClr val="tx1"/>
+                </a:solidFill>
+                <a:prstDash val="dash"/>
+              </a:ln>
+            </p:spPr>
+            <p:style>
+              <a:lnRef idx="1">
+                <a:schemeClr val="accent1"/>
+              </a:lnRef>
+              <a:fillRef idx="0">
+                <a:schemeClr val="accent1"/>
+              </a:fillRef>
+              <a:effectRef idx="0">
+                <a:schemeClr val="accent1"/>
+              </a:effectRef>
+              <a:fontRef idx="minor">
+                <a:schemeClr val="tx1"/>
+              </a:fontRef>
+            </p:style>
+          </p:cxnSp>
+          <p:cxnSp>
+            <p:nvCxnSpPr>
+              <p:cNvPr id="94" name="Straight Connector 93"/>
+              <p:cNvCxnSpPr/>
+              <p:nvPr/>
+            </p:nvCxnSpPr>
+            <p:spPr>
+              <a:xfrm>
+                <a:off x="10160835" y="3311159"/>
+                <a:ext cx="0" cy="370800"/>
+              </a:xfrm>
+              <a:prstGeom prst="line">
+                <a:avLst/>
+              </a:prstGeom>
+              <a:ln w="9525">
+                <a:solidFill>
+                  <a:schemeClr val="tx1"/>
+                </a:solidFill>
+                <a:prstDash val="dash"/>
+              </a:ln>
+            </p:spPr>
+            <p:style>
+              <a:lnRef idx="1">
+                <a:schemeClr val="accent1"/>
+              </a:lnRef>
+              <a:fillRef idx="0">
+                <a:schemeClr val="accent1"/>
+              </a:fillRef>
+              <a:effectRef idx="0">
+                <a:schemeClr val="accent1"/>
+              </a:effectRef>
+              <a:fontRef idx="minor">
+                <a:schemeClr val="tx1"/>
+              </a:fontRef>
+            </p:style>
+          </p:cxnSp>
+          <p:cxnSp>
+            <p:nvCxnSpPr>
+              <p:cNvPr id="95" name="Straight Connector 94"/>
+              <p:cNvCxnSpPr/>
+              <p:nvPr/>
+            </p:nvCxnSpPr>
+            <p:spPr>
+              <a:xfrm>
+                <a:off x="10511673" y="3312627"/>
+                <a:ext cx="0" cy="370800"/>
+              </a:xfrm>
+              <a:prstGeom prst="line">
+                <a:avLst/>
+              </a:prstGeom>
+              <a:ln w="9525">
+                <a:solidFill>
+                  <a:schemeClr val="tx1"/>
+                </a:solidFill>
+                <a:prstDash val="dash"/>
+              </a:ln>
+            </p:spPr>
+            <p:style>
+              <a:lnRef idx="1">
+                <a:schemeClr val="accent1"/>
+              </a:lnRef>
+              <a:fillRef idx="0">
+                <a:schemeClr val="accent1"/>
+              </a:fillRef>
+              <a:effectRef idx="0">
+                <a:schemeClr val="accent1"/>
+              </a:effectRef>
+              <a:fontRef idx="minor">
+                <a:schemeClr val="tx1"/>
+              </a:fontRef>
+            </p:style>
+          </p:cxnSp>
+          <p:cxnSp>
+            <p:nvCxnSpPr>
+              <p:cNvPr id="96" name="Straight Connector 95"/>
+              <p:cNvCxnSpPr/>
+              <p:nvPr/>
+            </p:nvCxnSpPr>
+            <p:spPr>
+              <a:xfrm>
+                <a:off x="10737098" y="3311159"/>
+                <a:ext cx="0" cy="370800"/>
+              </a:xfrm>
+              <a:prstGeom prst="line">
+                <a:avLst/>
+              </a:prstGeom>
+              <a:ln w="9525">
+                <a:solidFill>
+                  <a:schemeClr val="tx1"/>
+                </a:solidFill>
+                <a:prstDash val="dash"/>
+              </a:ln>
+            </p:spPr>
+            <p:style>
+              <a:lnRef idx="1">
+                <a:schemeClr val="accent1"/>
+              </a:lnRef>
+              <a:fillRef idx="0">
+                <a:schemeClr val="accent1"/>
+              </a:fillRef>
+              <a:effectRef idx="0">
+                <a:schemeClr val="accent1"/>
+              </a:effectRef>
+              <a:fontRef idx="minor">
+                <a:schemeClr val="tx1"/>
+              </a:fontRef>
+            </p:style>
+          </p:cxnSp>
+        </p:grpSp>
+        <p:sp>
+          <p:nvSpPr>
+            <p:cNvPr id="100" name="TextBox 99"/>
+            <p:cNvSpPr txBox="1"/>
+            <p:nvPr/>
+          </p:nvSpPr>
+          <p:spPr>
+            <a:xfrm>
+              <a:off x="8882516" y="2988532"/>
+              <a:ext cx="383438" cy="307777"/>
+            </a:xfrm>
+            <a:prstGeom prst="rect">
+              <a:avLst/>
+            </a:prstGeom>
+            <a:noFill/>
+          </p:spPr>
+          <p:txBody>
+            <a:bodyPr wrap="none" rtlCol="0">
+              <a:spAutoFit/>
+            </a:bodyPr>
+            <a:lstStyle/>
+            <a:p>
+              <a:pPr algn="ctr"/>
+              <a:r>
+                <a:rPr lang="en-GB" sz="1400" b="1" dirty="0" smtClean="0">
+                  <a:latin typeface="Arial" panose="020B0604020202020204" pitchFamily="34" charset="0"/>
+                  <a:cs typeface="Arial" panose="020B0604020202020204" pitchFamily="34" charset="0"/>
+                </a:rPr>
+                <a:t>c1</a:t>
+              </a:r>
+              <a:endParaRPr lang="en-GB" sz="1400" b="1" dirty="0">
+                <a:latin typeface="Arial" panose="020B0604020202020204" pitchFamily="34" charset="0"/>
+                <a:cs typeface="Arial" panose="020B0604020202020204" pitchFamily="34" charset="0"/>
+              </a:endParaRPr>
+            </a:p>
+          </p:txBody>
+        </p:sp>
+        <p:sp>
+          <p:nvSpPr>
+            <p:cNvPr id="101" name="TextBox 100"/>
+            <p:cNvSpPr txBox="1"/>
+            <p:nvPr/>
+          </p:nvSpPr>
+          <p:spPr>
+            <a:xfrm>
+              <a:off x="9799939" y="2988531"/>
+              <a:ext cx="383438" cy="307777"/>
+            </a:xfrm>
+            <a:prstGeom prst="rect">
+              <a:avLst/>
+            </a:prstGeom>
+            <a:noFill/>
+          </p:spPr>
+          <p:txBody>
+            <a:bodyPr wrap="none" rtlCol="0">
+              <a:spAutoFit/>
+            </a:bodyPr>
+            <a:lstStyle/>
+            <a:p>
+              <a:pPr algn="ctr"/>
+              <a:r>
+                <a:rPr lang="en-GB" sz="1400" b="1" dirty="0">
+                  <a:latin typeface="Arial" panose="020B0604020202020204" pitchFamily="34" charset="0"/>
+                  <a:cs typeface="Arial" panose="020B0604020202020204" pitchFamily="34" charset="0"/>
+                </a:rPr>
+                <a:t>a</a:t>
+              </a:r>
+              <a:r>
+                <a:rPr lang="en-GB" sz="1400" b="1" dirty="0" smtClean="0">
+                  <a:latin typeface="Arial" panose="020B0604020202020204" pitchFamily="34" charset="0"/>
+                  <a:cs typeface="Arial" panose="020B0604020202020204" pitchFamily="34" charset="0"/>
+                </a:rPr>
+                <a:t>2</a:t>
+              </a:r>
+              <a:endParaRPr lang="en-GB" sz="1400" b="1" dirty="0">
+                <a:latin typeface="Arial" panose="020B0604020202020204" pitchFamily="34" charset="0"/>
+                <a:cs typeface="Arial" panose="020B0604020202020204" pitchFamily="34" charset="0"/>
+              </a:endParaRPr>
+            </a:p>
+          </p:txBody>
+        </p:sp>
+        <p:sp>
+          <p:nvSpPr>
+            <p:cNvPr id="102" name="TextBox 101"/>
+            <p:cNvSpPr txBox="1"/>
+            <p:nvPr/>
+          </p:nvSpPr>
+          <p:spPr>
+            <a:xfrm>
+              <a:off x="8027700" y="2988532"/>
+              <a:ext cx="383438" cy="307777"/>
+            </a:xfrm>
+            <a:prstGeom prst="rect">
+              <a:avLst/>
+            </a:prstGeom>
+            <a:noFill/>
+          </p:spPr>
+          <p:txBody>
+            <a:bodyPr wrap="none" rtlCol="0">
+              <a:spAutoFit/>
+            </a:bodyPr>
+            <a:lstStyle/>
+            <a:p>
+              <a:pPr algn="ctr"/>
+              <a:r>
+                <a:rPr lang="en-GB" sz="1400" b="1" dirty="0" smtClean="0">
+                  <a:latin typeface="Arial" panose="020B0604020202020204" pitchFamily="34" charset="0"/>
+                  <a:cs typeface="Arial" panose="020B0604020202020204" pitchFamily="34" charset="0"/>
+                </a:rPr>
+                <a:t>a1</a:t>
+              </a:r>
+              <a:endParaRPr lang="en-GB" sz="1400" b="1" dirty="0">
+                <a:latin typeface="Arial" panose="020B0604020202020204" pitchFamily="34" charset="0"/>
+                <a:cs typeface="Arial" panose="020B0604020202020204" pitchFamily="34" charset="0"/>
+              </a:endParaRPr>
+            </a:p>
+          </p:txBody>
+        </p:sp>
+        <p:sp>
+          <p:nvSpPr>
+            <p:cNvPr id="103" name="TextBox 102"/>
+            <p:cNvSpPr txBox="1"/>
+            <p:nvPr/>
+          </p:nvSpPr>
+          <p:spPr>
+            <a:xfrm>
+              <a:off x="10494600" y="2988531"/>
+              <a:ext cx="383438" cy="307777"/>
+            </a:xfrm>
+            <a:prstGeom prst="rect">
+              <a:avLst/>
+            </a:prstGeom>
+            <a:noFill/>
+          </p:spPr>
+          <p:txBody>
+            <a:bodyPr wrap="none" rtlCol="0">
+              <a:spAutoFit/>
+            </a:bodyPr>
+            <a:lstStyle/>
+            <a:p>
+              <a:pPr algn="ctr"/>
+              <a:r>
+                <a:rPr lang="en-GB" sz="1400" b="1" dirty="0" smtClean="0">
+                  <a:latin typeface="Arial" panose="020B0604020202020204" pitchFamily="34" charset="0"/>
+                  <a:cs typeface="Arial" panose="020B0604020202020204" pitchFamily="34" charset="0"/>
+                </a:rPr>
+                <a:t>a3</a:t>
+              </a:r>
+              <a:endParaRPr lang="en-GB" sz="1400" b="1" dirty="0">
+                <a:latin typeface="Arial" panose="020B0604020202020204" pitchFamily="34" charset="0"/>
+                <a:cs typeface="Arial" panose="020B0604020202020204" pitchFamily="34" charset="0"/>
+              </a:endParaRPr>
+            </a:p>
+          </p:txBody>
+        </p:sp>
+      </p:grpSp>
+      <p:grpSp>
+        <p:nvGrpSpPr>
+          <p:cNvPr id="42" name="Group 41"/>
+          <p:cNvGrpSpPr/>
+          <p:nvPr/>
+        </p:nvGrpSpPr>
+        <p:grpSpPr>
+          <a:xfrm>
+            <a:off x="391552" y="2671074"/>
+            <a:ext cx="5765011" cy="2076263"/>
+            <a:chOff x="391552" y="2671074"/>
+            <a:chExt cx="5765011" cy="2076263"/>
+          </a:xfrm>
+        </p:grpSpPr>
+        <p:cxnSp>
+          <p:nvCxnSpPr>
+            <p:cNvPr id="53" name="Straight Connector 52"/>
+            <p:cNvCxnSpPr>
+              <a:stCxn id="60" idx="3"/>
+              <a:endCxn id="57" idx="1"/>
+            </p:cNvCxnSpPr>
+            <p:nvPr/>
+          </p:nvCxnSpPr>
+          <p:spPr>
+            <a:xfrm>
+              <a:off x="2529764" y="3130775"/>
+              <a:ext cx="1741328" cy="1282"/>
+            </a:xfrm>
+            <a:prstGeom prst="line">
+              <a:avLst/>
+            </a:prstGeom>
+            <a:ln w="19050">
+              <a:solidFill>
+                <a:schemeClr val="tx1"/>
+              </a:solidFill>
+            </a:ln>
+            <a:effectLst>
+              <a:outerShdw blurRad="50800" dist="38100" dir="2700000" algn="tl" rotWithShape="0">
+                <a:prstClr val="black">
+                  <a:alpha val="40000"/>
+                </a:prstClr>
+              </a:outerShdw>
+            </a:effectLst>
+          </p:spPr>
+          <p:style>
+            <a:lnRef idx="1">
+              <a:schemeClr val="accent1"/>
+            </a:lnRef>
+            <a:fillRef idx="0">
+              <a:schemeClr val="accent1"/>
+            </a:fillRef>
+            <a:effectRef idx="0">
+              <a:schemeClr val="accent1"/>
+            </a:effectRef>
+            <a:fontRef idx="minor">
+              <a:schemeClr val="tx1"/>
+            </a:fontRef>
+          </p:style>
+        </p:cxnSp>
+        <p:grpSp>
+          <p:nvGrpSpPr>
+            <p:cNvPr id="55" name="Group 54"/>
+            <p:cNvGrpSpPr/>
+            <p:nvPr/>
+          </p:nvGrpSpPr>
+          <p:grpSpPr>
+            <a:xfrm>
+              <a:off x="391552" y="2671074"/>
+              <a:ext cx="2138212" cy="919401"/>
+              <a:chOff x="2000083" y="1563410"/>
+              <a:chExt cx="2138212" cy="919401"/>
+            </a:xfrm>
+          </p:grpSpPr>
+          <p:sp>
+            <p:nvSpPr>
+              <p:cNvPr id="60" name="Rounded Rectangle 59"/>
+              <p:cNvSpPr/>
+              <p:nvPr/>
+            </p:nvSpPr>
+            <p:spPr>
+              <a:xfrm>
+                <a:off x="2000083" y="1563410"/>
+                <a:ext cx="2138212" cy="919401"/>
+              </a:xfrm>
+              <a:prstGeom prst="roundRect">
+                <a:avLst/>
+              </a:prstGeom>
+              <a:ln w="19050"/>
+              <a:effectLst>
+                <a:outerShdw blurRad="50800" dist="38100" dir="2700000" algn="tl" rotWithShape="0">
+                  <a:prstClr val="black">
+                    <a:alpha val="40000"/>
+                  </a:prstClr>
+                </a:outerShdw>
+              </a:effectLst>
+            </p:spPr>
+            <p:style>
+              <a:lnRef idx="2">
+                <a:schemeClr val="dk1"/>
+              </a:lnRef>
+              <a:fillRef idx="1">
+                <a:schemeClr val="lt1"/>
+              </a:fillRef>
+              <a:effectRef idx="0">
+                <a:schemeClr val="dk1"/>
+              </a:effectRef>
+              <a:fontRef idx="minor">
+                <a:schemeClr val="dk1"/>
+              </a:fontRef>
+            </p:style>
+            <p:txBody>
+              <a:bodyPr wrap="none" rtlCol="0" anchor="ctr">
+                <a:spAutoFit/>
+              </a:bodyPr>
+              <a:lstStyle/>
+              <a:p>
+                <a:pPr algn="ctr"/>
+                <a:r>
+                  <a:rPr lang="en-GB" sz="1600" b="1" dirty="0" smtClean="0">
+                    <a:latin typeface="Arial" panose="020B0604020202020204" pitchFamily="34" charset="0"/>
+                    <a:cs typeface="Arial" panose="020B0604020202020204" pitchFamily="34" charset="0"/>
+                  </a:rPr>
+                  <a:t>c1 : Cage</a:t>
+                </a:r>
+              </a:p>
+              <a:p>
+                <a:r>
+                  <a:rPr lang="en-GB" sz="1600" dirty="0" err="1" smtClean="0">
+                    <a:latin typeface="Arial" panose="020B0604020202020204" pitchFamily="34" charset="0"/>
+                    <a:cs typeface="Arial" panose="020B0604020202020204" pitchFamily="34" charset="0"/>
+                  </a:rPr>
+                  <a:t>totalSpace</a:t>
+                </a:r>
+                <a:r>
+                  <a:rPr lang="en-GB" sz="1600" dirty="0" smtClean="0">
+                    <a:latin typeface="Arial" panose="020B0604020202020204" pitchFamily="34" charset="0"/>
+                    <a:cs typeface="Arial" panose="020B0604020202020204" pitchFamily="34" charset="0"/>
+                  </a:rPr>
+                  <a:t> = 5</a:t>
+                </a:r>
+              </a:p>
+              <a:p>
+                <a:r>
+                  <a:rPr lang="en-GB" sz="1600" dirty="0" err="1" smtClean="0">
+                    <a:latin typeface="Arial" panose="020B0604020202020204" pitchFamily="34" charset="0"/>
+                    <a:cs typeface="Arial" panose="020B0604020202020204" pitchFamily="34" charset="0"/>
+                  </a:rPr>
+                  <a:t>spaceRemaining</a:t>
+                </a:r>
+                <a:r>
+                  <a:rPr lang="en-GB" sz="1600" dirty="0" smtClean="0">
+                    <a:latin typeface="Arial" panose="020B0604020202020204" pitchFamily="34" charset="0"/>
+                    <a:cs typeface="Arial" panose="020B0604020202020204" pitchFamily="34" charset="0"/>
+                  </a:rPr>
+                  <a:t> = 3</a:t>
+                </a:r>
+                <a:endParaRPr lang="en-GB" sz="1600" dirty="0">
+                  <a:latin typeface="Arial" panose="020B0604020202020204" pitchFamily="34" charset="0"/>
+                  <a:cs typeface="Arial" panose="020B0604020202020204" pitchFamily="34" charset="0"/>
+                </a:endParaRPr>
+              </a:p>
+            </p:txBody>
+          </p:sp>
+          <p:cxnSp>
+            <p:nvCxnSpPr>
+              <p:cNvPr id="62" name="Straight Connector 61"/>
+              <p:cNvCxnSpPr/>
+              <p:nvPr/>
+            </p:nvCxnSpPr>
+            <p:spPr>
+              <a:xfrm>
+                <a:off x="2019863" y="1917518"/>
+                <a:ext cx="2098651" cy="0"/>
+              </a:xfrm>
+              <a:prstGeom prst="line">
+                <a:avLst/>
+              </a:prstGeom>
+              <a:ln w="19050">
+                <a:solidFill>
+                  <a:schemeClr val="tx1"/>
+                </a:solidFill>
+              </a:ln>
+              <a:effectLst/>
+            </p:spPr>
+            <p:style>
+              <a:lnRef idx="1">
+                <a:schemeClr val="accent1"/>
+              </a:lnRef>
+              <a:fillRef idx="0">
+                <a:schemeClr val="accent1"/>
+              </a:fillRef>
+              <a:effectRef idx="0">
+                <a:schemeClr val="accent1"/>
+              </a:effectRef>
+              <a:fontRef idx="minor">
+                <a:schemeClr val="tx1"/>
+              </a:fontRef>
+            </p:style>
+          </p:cxnSp>
+        </p:grpSp>
+        <p:grpSp>
+          <p:nvGrpSpPr>
+            <p:cNvPr id="56" name="Group 55"/>
+            <p:cNvGrpSpPr/>
+            <p:nvPr/>
+          </p:nvGrpSpPr>
+          <p:grpSpPr>
+            <a:xfrm>
+              <a:off x="4263096" y="2672356"/>
+              <a:ext cx="1893467" cy="919401"/>
+              <a:chOff x="4993156" y="1564692"/>
+              <a:chExt cx="1893467" cy="919401"/>
+            </a:xfrm>
+          </p:grpSpPr>
+          <p:sp>
+            <p:nvSpPr>
+              <p:cNvPr id="57" name="Rounded Rectangle 56"/>
+              <p:cNvSpPr/>
+              <p:nvPr/>
+            </p:nvSpPr>
+            <p:spPr>
+              <a:xfrm>
+                <a:off x="5001152" y="1564692"/>
+                <a:ext cx="1877474" cy="919401"/>
+              </a:xfrm>
+              <a:prstGeom prst="roundRect">
+                <a:avLst/>
+              </a:prstGeom>
+              <a:ln w="19050"/>
+              <a:effectLst>
+                <a:outerShdw blurRad="50800" dist="38100" dir="2700000" algn="tl" rotWithShape="0">
+                  <a:prstClr val="black">
+                    <a:alpha val="40000"/>
+                  </a:prstClr>
+                </a:outerShdw>
+              </a:effectLst>
+            </p:spPr>
+            <p:style>
+              <a:lnRef idx="2">
+                <a:schemeClr val="dk1"/>
+              </a:lnRef>
+              <a:fillRef idx="1">
+                <a:schemeClr val="lt1"/>
+              </a:fillRef>
+              <a:effectRef idx="0">
+                <a:schemeClr val="dk1"/>
+              </a:effectRef>
+              <a:fontRef idx="minor">
+                <a:schemeClr val="dk1"/>
+              </a:fontRef>
+            </p:style>
+            <p:txBody>
+              <a:bodyPr wrap="none" rtlCol="0" anchor="ctr">
+                <a:spAutoFit/>
+              </a:bodyPr>
+              <a:lstStyle/>
+              <a:p>
+                <a:pPr algn="ctr"/>
+                <a:r>
+                  <a:rPr lang="en-GB" sz="1600" b="1" dirty="0" smtClean="0">
+                    <a:latin typeface="Arial" panose="020B0604020202020204" pitchFamily="34" charset="0"/>
+                    <a:cs typeface="Arial" panose="020B0604020202020204" pitchFamily="34" charset="0"/>
+                  </a:rPr>
+                  <a:t>a1 : Animal</a:t>
+                </a:r>
+              </a:p>
+              <a:p>
+                <a:r>
+                  <a:rPr lang="en-GB" sz="1600" dirty="0" smtClean="0">
+                    <a:latin typeface="Arial" panose="020B0604020202020204" pitchFamily="34" charset="0"/>
+                    <a:cs typeface="Arial" panose="020B0604020202020204" pitchFamily="34" charset="0"/>
+                  </a:rPr>
+                  <a:t>count : </a:t>
+                </a:r>
+                <a:r>
+                  <a:rPr lang="en-GB" sz="1600" dirty="0" smtClean="0">
+                    <a:latin typeface="Arial" panose="020B0604020202020204" pitchFamily="34" charset="0"/>
+                    <a:cs typeface="Arial" panose="020B0604020202020204" pitchFamily="34" charset="0"/>
+                  </a:rPr>
+                  <a:t>1</a:t>
+                </a:r>
+                <a:endParaRPr lang="en-GB" sz="1600" dirty="0" smtClean="0">
+                  <a:latin typeface="Arial" panose="020B0604020202020204" pitchFamily="34" charset="0"/>
+                  <a:cs typeface="Arial" panose="020B0604020202020204" pitchFamily="34" charset="0"/>
+                </a:endParaRPr>
+              </a:p>
+              <a:p>
+                <a:r>
+                  <a:rPr lang="en-GB" sz="1600" dirty="0" err="1" smtClean="0">
+                    <a:latin typeface="Arial" panose="020B0604020202020204" pitchFamily="34" charset="0"/>
+                    <a:cs typeface="Arial" panose="020B0604020202020204" pitchFamily="34" charset="0"/>
+                  </a:rPr>
+                  <a:t>spaceRequired</a:t>
+                </a:r>
+                <a:r>
+                  <a:rPr lang="en-GB" sz="1600" dirty="0" smtClean="0">
+                    <a:latin typeface="Arial" panose="020B0604020202020204" pitchFamily="34" charset="0"/>
+                    <a:cs typeface="Arial" panose="020B0604020202020204" pitchFamily="34" charset="0"/>
+                  </a:rPr>
+                  <a:t>: 1</a:t>
+                </a:r>
+                <a:endParaRPr lang="en-GB" sz="1600" dirty="0">
+                  <a:latin typeface="Arial" panose="020B0604020202020204" pitchFamily="34" charset="0"/>
+                  <a:cs typeface="Arial" panose="020B0604020202020204" pitchFamily="34" charset="0"/>
+                </a:endParaRPr>
+              </a:p>
+            </p:txBody>
+          </p:sp>
+          <p:cxnSp>
+            <p:nvCxnSpPr>
+              <p:cNvPr id="59" name="Straight Connector 58"/>
+              <p:cNvCxnSpPr/>
+              <p:nvPr/>
+            </p:nvCxnSpPr>
+            <p:spPr>
+              <a:xfrm>
+                <a:off x="4993156" y="1917518"/>
+                <a:ext cx="1893467" cy="0"/>
+              </a:xfrm>
+              <a:prstGeom prst="line">
+                <a:avLst/>
+              </a:prstGeom>
+              <a:ln w="19050">
+                <a:solidFill>
+                  <a:schemeClr val="tx1"/>
+                </a:solidFill>
+              </a:ln>
+              <a:effectLst/>
+            </p:spPr>
+            <p:style>
+              <a:lnRef idx="1">
+                <a:schemeClr val="accent1"/>
+              </a:lnRef>
+              <a:fillRef idx="0">
+                <a:schemeClr val="accent1"/>
+              </a:fillRef>
+              <a:effectRef idx="0">
+                <a:schemeClr val="accent1"/>
+              </a:effectRef>
+              <a:fontRef idx="minor">
+                <a:schemeClr val="tx1"/>
+              </a:fontRef>
+            </p:style>
+          </p:cxnSp>
+        </p:grpSp>
+        <p:grpSp>
+          <p:nvGrpSpPr>
+            <p:cNvPr id="69" name="Group 68"/>
+            <p:cNvGrpSpPr/>
+            <p:nvPr/>
+          </p:nvGrpSpPr>
+          <p:grpSpPr>
+            <a:xfrm>
+              <a:off x="1583607" y="3823713"/>
+              <a:ext cx="1893467" cy="919401"/>
+              <a:chOff x="4993156" y="1564692"/>
+              <a:chExt cx="1893467" cy="919401"/>
+            </a:xfrm>
+          </p:grpSpPr>
+          <p:sp>
+            <p:nvSpPr>
+              <p:cNvPr id="70" name="Rounded Rectangle 69"/>
+              <p:cNvSpPr/>
+              <p:nvPr/>
+            </p:nvSpPr>
+            <p:spPr>
+              <a:xfrm>
+                <a:off x="5001152" y="1564692"/>
+                <a:ext cx="1877474" cy="919401"/>
+              </a:xfrm>
+              <a:prstGeom prst="roundRect">
+                <a:avLst/>
+              </a:prstGeom>
+              <a:ln w="19050"/>
+              <a:effectLst>
+                <a:outerShdw blurRad="50800" dist="38100" dir="2700000" algn="tl" rotWithShape="0">
+                  <a:prstClr val="black">
+                    <a:alpha val="40000"/>
+                  </a:prstClr>
+                </a:outerShdw>
+              </a:effectLst>
+            </p:spPr>
+            <p:style>
+              <a:lnRef idx="2">
+                <a:schemeClr val="dk1"/>
+              </a:lnRef>
+              <a:fillRef idx="1">
+                <a:schemeClr val="lt1"/>
+              </a:fillRef>
+              <a:effectRef idx="0">
+                <a:schemeClr val="dk1"/>
+              </a:effectRef>
+              <a:fontRef idx="minor">
+                <a:schemeClr val="dk1"/>
+              </a:fontRef>
+            </p:style>
+            <p:txBody>
+              <a:bodyPr wrap="none" rtlCol="0" anchor="ctr">
+                <a:spAutoFit/>
+              </a:bodyPr>
+              <a:lstStyle/>
+              <a:p>
+                <a:pPr algn="ctr"/>
+                <a:r>
+                  <a:rPr lang="en-GB" sz="1600" b="1" dirty="0" smtClean="0">
+                    <a:latin typeface="Arial" panose="020B0604020202020204" pitchFamily="34" charset="0"/>
+                    <a:cs typeface="Arial" panose="020B0604020202020204" pitchFamily="34" charset="0"/>
+                  </a:rPr>
+                  <a:t>a2 : Animal</a:t>
+                </a:r>
+              </a:p>
+              <a:p>
+                <a:r>
+                  <a:rPr lang="en-GB" sz="1600" dirty="0" smtClean="0">
+                    <a:latin typeface="Arial" panose="020B0604020202020204" pitchFamily="34" charset="0"/>
+                    <a:cs typeface="Arial" panose="020B0604020202020204" pitchFamily="34" charset="0"/>
+                  </a:rPr>
+                  <a:t>count : 1</a:t>
+                </a:r>
+              </a:p>
+              <a:p>
+                <a:r>
+                  <a:rPr lang="en-GB" sz="1600" dirty="0" err="1" smtClean="0">
+                    <a:latin typeface="Arial" panose="020B0604020202020204" pitchFamily="34" charset="0"/>
+                    <a:cs typeface="Arial" panose="020B0604020202020204" pitchFamily="34" charset="0"/>
+                  </a:rPr>
+                  <a:t>spaceRequired</a:t>
+                </a:r>
+                <a:r>
+                  <a:rPr lang="en-GB" sz="1600" dirty="0" smtClean="0">
+                    <a:latin typeface="Arial" panose="020B0604020202020204" pitchFamily="34" charset="0"/>
+                    <a:cs typeface="Arial" panose="020B0604020202020204" pitchFamily="34" charset="0"/>
+                  </a:rPr>
+                  <a:t>: </a:t>
+                </a:r>
+                <a:r>
+                  <a:rPr lang="en-GB" sz="1600" dirty="0" smtClean="0">
+                    <a:latin typeface="Arial" panose="020B0604020202020204" pitchFamily="34" charset="0"/>
+                    <a:cs typeface="Arial" panose="020B0604020202020204" pitchFamily="34" charset="0"/>
+                  </a:rPr>
+                  <a:t>1</a:t>
+                </a:r>
+                <a:endParaRPr lang="en-GB" sz="1600" dirty="0">
+                  <a:latin typeface="Arial" panose="020B0604020202020204" pitchFamily="34" charset="0"/>
+                  <a:cs typeface="Arial" panose="020B0604020202020204" pitchFamily="34" charset="0"/>
+                </a:endParaRPr>
+              </a:p>
+            </p:txBody>
+          </p:sp>
+          <p:cxnSp>
+            <p:nvCxnSpPr>
+              <p:cNvPr id="72" name="Straight Connector 71"/>
+              <p:cNvCxnSpPr/>
+              <p:nvPr/>
+            </p:nvCxnSpPr>
+            <p:spPr>
+              <a:xfrm>
+                <a:off x="4993156" y="1917518"/>
+                <a:ext cx="1893467" cy="0"/>
+              </a:xfrm>
+              <a:prstGeom prst="line">
+                <a:avLst/>
+              </a:prstGeom>
+              <a:ln w="19050">
+                <a:solidFill>
+                  <a:schemeClr val="tx1"/>
+                </a:solidFill>
+              </a:ln>
+              <a:effectLst/>
+            </p:spPr>
+            <p:style>
+              <a:lnRef idx="1">
+                <a:schemeClr val="accent1"/>
+              </a:lnRef>
+              <a:fillRef idx="0">
+                <a:schemeClr val="accent1"/>
+              </a:fillRef>
+              <a:effectRef idx="0">
+                <a:schemeClr val="accent1"/>
+              </a:effectRef>
+              <a:fontRef idx="minor">
+                <a:schemeClr val="tx1"/>
+              </a:fontRef>
+            </p:style>
+          </p:cxnSp>
+        </p:grpSp>
+        <p:cxnSp>
+          <p:nvCxnSpPr>
+            <p:cNvPr id="73" name="Straight Connector 72"/>
+            <p:cNvCxnSpPr>
+              <a:stCxn id="60" idx="2"/>
+              <a:endCxn id="70" idx="1"/>
+            </p:cNvCxnSpPr>
+            <p:nvPr/>
+          </p:nvCxnSpPr>
+          <p:spPr>
+            <a:xfrm rot="16200000" flipH="1">
+              <a:off x="1179661" y="3871471"/>
+              <a:ext cx="692939" cy="130945"/>
+            </a:xfrm>
+            <a:prstGeom prst="bentConnector2">
+              <a:avLst/>
+            </a:prstGeom>
+            <a:ln w="19050">
+              <a:solidFill>
+                <a:schemeClr val="tx1"/>
+              </a:solidFill>
+            </a:ln>
+            <a:effectLst>
+              <a:outerShdw blurRad="50800" dist="38100" dir="2700000" algn="tl" rotWithShape="0">
+                <a:prstClr val="black">
+                  <a:alpha val="40000"/>
+                </a:prstClr>
+              </a:outerShdw>
+            </a:effectLst>
+          </p:spPr>
+          <p:style>
+            <a:lnRef idx="1">
+              <a:schemeClr val="accent1"/>
+            </a:lnRef>
+            <a:fillRef idx="0">
+              <a:schemeClr val="accent1"/>
+            </a:fillRef>
+            <a:effectRef idx="0">
+              <a:schemeClr val="accent1"/>
+            </a:effectRef>
+            <a:fontRef idx="minor">
+              <a:schemeClr val="tx1"/>
+            </a:fontRef>
+          </p:style>
+        </p:cxnSp>
+        <p:grpSp>
+          <p:nvGrpSpPr>
+            <p:cNvPr id="71" name="Group 70"/>
+            <p:cNvGrpSpPr/>
+            <p:nvPr/>
+          </p:nvGrpSpPr>
+          <p:grpSpPr>
+            <a:xfrm>
+              <a:off x="4263096" y="3827936"/>
+              <a:ext cx="1893467" cy="919401"/>
+              <a:chOff x="4993156" y="1564692"/>
+              <a:chExt cx="1893467" cy="919401"/>
+            </a:xfrm>
+          </p:grpSpPr>
+          <p:sp>
+            <p:nvSpPr>
+              <p:cNvPr id="74" name="Rounded Rectangle 73"/>
+              <p:cNvSpPr/>
+              <p:nvPr/>
+            </p:nvSpPr>
+            <p:spPr>
+              <a:xfrm>
+                <a:off x="5001152" y="1564692"/>
+                <a:ext cx="1877474" cy="919401"/>
+              </a:xfrm>
+              <a:prstGeom prst="roundRect">
+                <a:avLst/>
+              </a:prstGeom>
+              <a:ln w="19050"/>
+              <a:effectLst>
+                <a:outerShdw blurRad="50800" dist="38100" dir="2700000" algn="tl" rotWithShape="0">
+                  <a:prstClr val="black">
+                    <a:alpha val="40000"/>
+                  </a:prstClr>
+                </a:outerShdw>
+              </a:effectLst>
+            </p:spPr>
+            <p:style>
+              <a:lnRef idx="2">
+                <a:schemeClr val="dk1"/>
+              </a:lnRef>
+              <a:fillRef idx="1">
+                <a:schemeClr val="lt1"/>
+              </a:fillRef>
+              <a:effectRef idx="0">
+                <a:schemeClr val="dk1"/>
+              </a:effectRef>
+              <a:fontRef idx="minor">
+                <a:schemeClr val="dk1"/>
+              </a:fontRef>
+            </p:style>
+            <p:txBody>
+              <a:bodyPr wrap="none" rtlCol="0" anchor="ctr">
+                <a:spAutoFit/>
+              </a:bodyPr>
+              <a:lstStyle/>
+              <a:p>
+                <a:pPr algn="ctr"/>
+                <a:r>
+                  <a:rPr lang="en-GB" sz="1600" b="1" dirty="0" smtClean="0">
+                    <a:latin typeface="Arial" panose="020B0604020202020204" pitchFamily="34" charset="0"/>
+                    <a:cs typeface="Arial" panose="020B0604020202020204" pitchFamily="34" charset="0"/>
+                  </a:rPr>
+                  <a:t>a3 </a:t>
+                </a:r>
+                <a:r>
+                  <a:rPr lang="en-GB" sz="1600" b="1" dirty="0" smtClean="0">
+                    <a:latin typeface="Arial" panose="020B0604020202020204" pitchFamily="34" charset="0"/>
+                    <a:cs typeface="Arial" panose="020B0604020202020204" pitchFamily="34" charset="0"/>
+                  </a:rPr>
+                  <a:t>: Animal</a:t>
+                </a:r>
+              </a:p>
+              <a:p>
+                <a:r>
+                  <a:rPr lang="en-GB" sz="1600" dirty="0" smtClean="0">
+                    <a:latin typeface="Arial" panose="020B0604020202020204" pitchFamily="34" charset="0"/>
+                    <a:cs typeface="Arial" panose="020B0604020202020204" pitchFamily="34" charset="0"/>
+                  </a:rPr>
+                  <a:t>count : 1</a:t>
+                </a:r>
+              </a:p>
+              <a:p>
+                <a:r>
+                  <a:rPr lang="en-GB" sz="1600" dirty="0" err="1" smtClean="0">
+                    <a:latin typeface="Arial" panose="020B0604020202020204" pitchFamily="34" charset="0"/>
+                    <a:cs typeface="Arial" panose="020B0604020202020204" pitchFamily="34" charset="0"/>
+                  </a:rPr>
+                  <a:t>spaceRequired</a:t>
+                </a:r>
+                <a:r>
+                  <a:rPr lang="en-GB" sz="1600" dirty="0" smtClean="0">
+                    <a:latin typeface="Arial" panose="020B0604020202020204" pitchFamily="34" charset="0"/>
+                    <a:cs typeface="Arial" panose="020B0604020202020204" pitchFamily="34" charset="0"/>
+                  </a:rPr>
+                  <a:t>: 2</a:t>
+                </a:r>
+                <a:endParaRPr lang="en-GB" sz="1600" dirty="0">
+                  <a:latin typeface="Arial" panose="020B0604020202020204" pitchFamily="34" charset="0"/>
+                  <a:cs typeface="Arial" panose="020B0604020202020204" pitchFamily="34" charset="0"/>
+                </a:endParaRPr>
+              </a:p>
+            </p:txBody>
+          </p:sp>
+          <p:cxnSp>
+            <p:nvCxnSpPr>
+              <p:cNvPr id="75" name="Straight Connector 74"/>
+              <p:cNvCxnSpPr/>
+              <p:nvPr/>
+            </p:nvCxnSpPr>
+            <p:spPr>
+              <a:xfrm>
+                <a:off x="4993156" y="1917518"/>
+                <a:ext cx="1893467" cy="0"/>
+              </a:xfrm>
+              <a:prstGeom prst="line">
+                <a:avLst/>
+              </a:prstGeom>
+              <a:ln w="19050">
+                <a:solidFill>
+                  <a:schemeClr val="tx1"/>
+                </a:solidFill>
+              </a:ln>
+              <a:effectLst/>
+            </p:spPr>
+            <p:style>
+              <a:lnRef idx="1">
+                <a:schemeClr val="accent1"/>
+              </a:lnRef>
+              <a:fillRef idx="0">
+                <a:schemeClr val="accent1"/>
+              </a:fillRef>
+              <a:effectRef idx="0">
+                <a:schemeClr val="accent1"/>
+              </a:effectRef>
+              <a:fontRef idx="minor">
+                <a:schemeClr val="tx1"/>
+              </a:fontRef>
+            </p:style>
+          </p:cxnSp>
+        </p:grpSp>
+        <p:cxnSp>
+          <p:nvCxnSpPr>
+            <p:cNvPr id="77" name="Straight Connector 76"/>
+            <p:cNvCxnSpPr>
+              <a:stCxn id="70" idx="3"/>
+              <a:endCxn id="74" idx="1"/>
+            </p:cNvCxnSpPr>
+            <p:nvPr/>
+          </p:nvCxnSpPr>
+          <p:spPr>
+            <a:xfrm>
+              <a:off x="3469077" y="4283414"/>
+              <a:ext cx="802015" cy="4223"/>
+            </a:xfrm>
+            <a:prstGeom prst="line">
+              <a:avLst/>
+            </a:prstGeom>
+            <a:ln w="19050">
+              <a:solidFill>
+                <a:schemeClr val="tx1"/>
+              </a:solidFill>
+            </a:ln>
+            <a:effectLst>
+              <a:outerShdw blurRad="50800" dist="38100" dir="2700000" algn="tl" rotWithShape="0">
+                <a:prstClr val="black">
+                  <a:alpha val="40000"/>
+                </a:prstClr>
+              </a:outerShdw>
+            </a:effectLst>
+          </p:spPr>
+          <p:style>
+            <a:lnRef idx="1">
+              <a:schemeClr val="accent1"/>
+            </a:lnRef>
+            <a:fillRef idx="0">
+              <a:schemeClr val="accent1"/>
+            </a:fillRef>
+            <a:effectRef idx="0">
+              <a:schemeClr val="accent1"/>
+            </a:effectRef>
+            <a:fontRef idx="minor">
+              <a:schemeClr val="tx1"/>
+            </a:fontRef>
+          </p:style>
+        </p:cxnSp>
+        <p:sp>
+          <p:nvSpPr>
+            <p:cNvPr id="78" name="Rectangle 77"/>
+            <p:cNvSpPr/>
+            <p:nvPr/>
+          </p:nvSpPr>
+          <p:spPr>
+            <a:xfrm>
+              <a:off x="3761399" y="3980835"/>
+              <a:ext cx="522900" cy="307777"/>
+            </a:xfrm>
+            <a:prstGeom prst="rect">
+              <a:avLst/>
+            </a:prstGeom>
+            <a:noFill/>
+            <a:ln w="19050">
+              <a:noFill/>
+            </a:ln>
+            <a:effectLst/>
+          </p:spPr>
+          <p:style>
+            <a:lnRef idx="2">
+              <a:schemeClr val="dk1"/>
+            </a:lnRef>
+            <a:fillRef idx="1">
+              <a:schemeClr val="lt1"/>
+            </a:fillRef>
+            <a:effectRef idx="0">
+              <a:schemeClr val="dk1"/>
+            </a:effectRef>
+            <a:fontRef idx="minor">
+              <a:schemeClr val="dk1"/>
+            </a:fontRef>
+          </p:style>
+          <p:txBody>
+            <a:bodyPr wrap="none" rtlCol="0" anchor="ctr">
+              <a:spAutoFit/>
+            </a:bodyPr>
+            <a:lstStyle/>
+            <a:p>
+              <a:r>
+                <a:rPr lang="en-GB" sz="1400" dirty="0" smtClean="0">
+                  <a:latin typeface="Arial" panose="020B0604020202020204" pitchFamily="34" charset="0"/>
+                  <a:cs typeface="Arial" panose="020B0604020202020204" pitchFamily="34" charset="0"/>
+                </a:rPr>
+                <a:t>eats</a:t>
+              </a:r>
+              <a:endParaRPr lang="en-GB" sz="1400" dirty="0">
+                <a:latin typeface="Arial" panose="020B0604020202020204" pitchFamily="34" charset="0"/>
+                <a:cs typeface="Arial" panose="020B0604020202020204" pitchFamily="34" charset="0"/>
+              </a:endParaRPr>
+            </a:p>
+          </p:txBody>
+        </p:sp>
+      </p:grpSp>
+      <p:grpSp>
+        <p:nvGrpSpPr>
+          <p:cNvPr id="15" name="Group 14"/>
+          <p:cNvGrpSpPr/>
+          <p:nvPr/>
+        </p:nvGrpSpPr>
+        <p:grpSpPr>
+          <a:xfrm>
+            <a:off x="8744392" y="4841802"/>
+            <a:ext cx="2564607" cy="696798"/>
+            <a:chOff x="6917531" y="3503727"/>
+            <a:chExt cx="2564607" cy="696798"/>
+          </a:xfrm>
+        </p:grpSpPr>
+        <p:grpSp>
+          <p:nvGrpSpPr>
+            <p:cNvPr id="81" name="Group 80"/>
+            <p:cNvGrpSpPr/>
+            <p:nvPr/>
+          </p:nvGrpSpPr>
+          <p:grpSpPr>
+            <a:xfrm>
+              <a:off x="6950583" y="3826355"/>
+              <a:ext cx="2530106" cy="372268"/>
+              <a:chOff x="8508185" y="3311159"/>
+              <a:chExt cx="2530106" cy="372268"/>
+            </a:xfrm>
+          </p:grpSpPr>
+          <p:sp>
+            <p:nvSpPr>
+              <p:cNvPr id="109" name="TextBox 108"/>
+              <p:cNvSpPr txBox="1"/>
+              <p:nvPr/>
+            </p:nvSpPr>
+            <p:spPr>
+              <a:xfrm>
+                <a:off x="8508185" y="3312627"/>
+                <a:ext cx="2530106" cy="369332"/>
+              </a:xfrm>
+              <a:prstGeom prst="rect">
+                <a:avLst/>
+              </a:prstGeom>
+              <a:ln w="19050">
+                <a:noFill/>
+              </a:ln>
+              <a:effectLst>
+                <a:outerShdw blurRad="50800" dist="38100" dir="2700000" algn="tl" rotWithShape="0">
+                  <a:prstClr val="black">
+                    <a:alpha val="40000"/>
+                  </a:prstClr>
+                </a:outerShdw>
+              </a:effectLst>
+            </p:spPr>
+            <p:style>
+              <a:lnRef idx="2">
+                <a:schemeClr val="dk1"/>
+              </a:lnRef>
+              <a:fillRef idx="1">
+                <a:schemeClr val="lt1"/>
+              </a:fillRef>
+              <a:effectRef idx="0">
+                <a:schemeClr val="dk1"/>
+              </a:effectRef>
+              <a:fontRef idx="minor">
+                <a:schemeClr val="dk1"/>
+              </a:fontRef>
+            </p:style>
+            <p:txBody>
+              <a:bodyPr wrap="none" lIns="36000" rIns="36000" rtlCol="0">
+                <a:spAutoFit/>
+              </a:bodyPr>
+              <a:lstStyle/>
+              <a:p>
+                <a:r>
+                  <a:rPr lang="en-GB" dirty="0" smtClean="0"/>
+                  <a:t>100011523202112121122</a:t>
+                </a:r>
+                <a:endParaRPr lang="en-GB" dirty="0"/>
+              </a:p>
+            </p:txBody>
+          </p:sp>
+          <p:cxnSp>
+            <p:nvCxnSpPr>
+              <p:cNvPr id="111" name="Straight Connector 110"/>
+              <p:cNvCxnSpPr/>
+              <p:nvPr/>
+            </p:nvCxnSpPr>
+            <p:spPr>
+              <a:xfrm>
+                <a:off x="9578853" y="3311159"/>
+                <a:ext cx="0" cy="370800"/>
+              </a:xfrm>
+              <a:prstGeom prst="line">
+                <a:avLst/>
+              </a:prstGeom>
+              <a:ln w="19050">
+                <a:solidFill>
+                  <a:schemeClr val="tx1"/>
+                </a:solidFill>
+              </a:ln>
+            </p:spPr>
+            <p:style>
+              <a:lnRef idx="1">
+                <a:schemeClr val="accent1"/>
+              </a:lnRef>
+              <a:fillRef idx="0">
+                <a:schemeClr val="accent1"/>
+              </a:fillRef>
+              <a:effectRef idx="0">
+                <a:schemeClr val="accent1"/>
+              </a:effectRef>
+              <a:fontRef idx="minor">
+                <a:schemeClr val="tx1"/>
+              </a:fontRef>
+            </p:style>
+          </p:cxnSp>
+          <p:cxnSp>
+            <p:nvCxnSpPr>
+              <p:cNvPr id="112" name="Straight Connector 111"/>
+              <p:cNvCxnSpPr/>
+              <p:nvPr/>
+            </p:nvCxnSpPr>
+            <p:spPr>
+              <a:xfrm>
+                <a:off x="10392726" y="3311159"/>
+                <a:ext cx="0" cy="370800"/>
+              </a:xfrm>
+              <a:prstGeom prst="line">
+                <a:avLst/>
+              </a:prstGeom>
+              <a:ln w="19050">
+                <a:solidFill>
+                  <a:schemeClr val="tx1"/>
+                </a:solidFill>
+              </a:ln>
+            </p:spPr>
+            <p:style>
+              <a:lnRef idx="1">
+                <a:schemeClr val="accent1"/>
+              </a:lnRef>
+              <a:fillRef idx="0">
+                <a:schemeClr val="accent1"/>
+              </a:fillRef>
+              <a:effectRef idx="0">
+                <a:schemeClr val="accent1"/>
+              </a:effectRef>
+              <a:fontRef idx="minor">
+                <a:schemeClr val="tx1"/>
+              </a:fontRef>
+            </p:style>
+          </p:cxnSp>
+          <p:cxnSp>
+            <p:nvCxnSpPr>
+              <p:cNvPr id="115" name="Straight Connector 114"/>
+              <p:cNvCxnSpPr/>
+              <p:nvPr/>
+            </p:nvCxnSpPr>
+            <p:spPr>
+              <a:xfrm>
+                <a:off x="8648741" y="3312627"/>
+                <a:ext cx="0" cy="370800"/>
+              </a:xfrm>
+              <a:prstGeom prst="line">
+                <a:avLst/>
+              </a:prstGeom>
+              <a:ln w="9525">
+                <a:solidFill>
+                  <a:schemeClr val="tx1"/>
+                </a:solidFill>
+                <a:prstDash val="dash"/>
+              </a:ln>
+            </p:spPr>
+            <p:style>
+              <a:lnRef idx="1">
+                <a:schemeClr val="accent1"/>
+              </a:lnRef>
+              <a:fillRef idx="0">
+                <a:schemeClr val="accent1"/>
+              </a:fillRef>
+              <a:effectRef idx="0">
+                <a:schemeClr val="accent1"/>
+              </a:effectRef>
+              <a:fontRef idx="minor">
+                <a:schemeClr val="tx1"/>
+              </a:fontRef>
+            </p:style>
+          </p:cxnSp>
+          <p:cxnSp>
+            <p:nvCxnSpPr>
+              <p:cNvPr id="116" name="Straight Connector 115"/>
+              <p:cNvCxnSpPr/>
+              <p:nvPr/>
+            </p:nvCxnSpPr>
+            <p:spPr>
+              <a:xfrm>
+                <a:off x="8885279" y="3312627"/>
+                <a:ext cx="0" cy="370800"/>
+              </a:xfrm>
+              <a:prstGeom prst="line">
+                <a:avLst/>
+              </a:prstGeom>
+              <a:ln w="9525">
+                <a:solidFill>
+                  <a:schemeClr val="tx1"/>
+                </a:solidFill>
+                <a:prstDash val="dash"/>
+              </a:ln>
+            </p:spPr>
+            <p:style>
+              <a:lnRef idx="1">
+                <a:schemeClr val="accent1"/>
+              </a:lnRef>
+              <a:fillRef idx="0">
+                <a:schemeClr val="accent1"/>
+              </a:fillRef>
+              <a:effectRef idx="0">
+                <a:schemeClr val="accent1"/>
+              </a:effectRef>
+              <a:fontRef idx="minor">
+                <a:schemeClr val="tx1"/>
+              </a:fontRef>
+            </p:style>
+          </p:cxnSp>
+          <p:cxnSp>
+            <p:nvCxnSpPr>
+              <p:cNvPr id="117" name="Straight Connector 116"/>
+              <p:cNvCxnSpPr/>
+              <p:nvPr/>
+            </p:nvCxnSpPr>
+            <p:spPr>
+              <a:xfrm>
+                <a:off x="9116260" y="3312627"/>
+                <a:ext cx="0" cy="370800"/>
+              </a:xfrm>
+              <a:prstGeom prst="line">
+                <a:avLst/>
+              </a:prstGeom>
+              <a:ln w="9525">
+                <a:solidFill>
+                  <a:schemeClr val="tx1"/>
+                </a:solidFill>
+                <a:prstDash val="dash"/>
+              </a:ln>
+            </p:spPr>
+            <p:style>
+              <a:lnRef idx="1">
+                <a:schemeClr val="accent1"/>
+              </a:lnRef>
+              <a:fillRef idx="0">
+                <a:schemeClr val="accent1"/>
+              </a:fillRef>
+              <a:effectRef idx="0">
+                <a:schemeClr val="accent1"/>
+              </a:effectRef>
+              <a:fontRef idx="minor">
+                <a:schemeClr val="tx1"/>
+              </a:fontRef>
+            </p:style>
+          </p:cxnSp>
+          <p:cxnSp>
+            <p:nvCxnSpPr>
+              <p:cNvPr id="118" name="Straight Connector 117"/>
+              <p:cNvCxnSpPr/>
+              <p:nvPr/>
+            </p:nvCxnSpPr>
+            <p:spPr>
+              <a:xfrm>
+                <a:off x="9346447" y="3311159"/>
+                <a:ext cx="0" cy="370800"/>
+              </a:xfrm>
+              <a:prstGeom prst="line">
+                <a:avLst/>
+              </a:prstGeom>
+              <a:ln w="9525">
+                <a:solidFill>
+                  <a:schemeClr val="tx1"/>
+                </a:solidFill>
+                <a:prstDash val="dash"/>
+              </a:ln>
+            </p:spPr>
+            <p:style>
+              <a:lnRef idx="1">
+                <a:schemeClr val="accent1"/>
+              </a:lnRef>
+              <a:fillRef idx="0">
+                <a:schemeClr val="accent1"/>
+              </a:fillRef>
+              <a:effectRef idx="0">
+                <a:schemeClr val="accent1"/>
+              </a:effectRef>
+              <a:fontRef idx="minor">
+                <a:schemeClr val="tx1"/>
+              </a:fontRef>
+            </p:style>
+          </p:cxnSp>
+          <p:cxnSp>
+            <p:nvCxnSpPr>
+              <p:cNvPr id="119" name="Straight Connector 118"/>
+              <p:cNvCxnSpPr/>
+              <p:nvPr/>
+            </p:nvCxnSpPr>
+            <p:spPr>
+              <a:xfrm>
+                <a:off x="9692522" y="3312627"/>
+                <a:ext cx="0" cy="370800"/>
+              </a:xfrm>
+              <a:prstGeom prst="line">
+                <a:avLst/>
+              </a:prstGeom>
+              <a:ln w="9525">
+                <a:solidFill>
+                  <a:schemeClr val="tx1"/>
+                </a:solidFill>
+                <a:prstDash val="dash"/>
+              </a:ln>
+            </p:spPr>
+            <p:style>
+              <a:lnRef idx="1">
+                <a:schemeClr val="accent1"/>
+              </a:lnRef>
+              <a:fillRef idx="0">
+                <a:schemeClr val="accent1"/>
+              </a:fillRef>
+              <a:effectRef idx="0">
+                <a:schemeClr val="accent1"/>
+              </a:effectRef>
+              <a:fontRef idx="minor">
+                <a:schemeClr val="tx1"/>
+              </a:fontRef>
+            </p:style>
+          </p:cxnSp>
+          <p:cxnSp>
+            <p:nvCxnSpPr>
+              <p:cNvPr id="120" name="Straight Connector 119"/>
+              <p:cNvCxnSpPr/>
+              <p:nvPr/>
+            </p:nvCxnSpPr>
+            <p:spPr>
+              <a:xfrm>
+                <a:off x="9928266" y="3312627"/>
+                <a:ext cx="0" cy="370800"/>
+              </a:xfrm>
+              <a:prstGeom prst="line">
+                <a:avLst/>
+              </a:prstGeom>
+              <a:ln w="9525">
+                <a:solidFill>
+                  <a:schemeClr val="tx1"/>
+                </a:solidFill>
+                <a:prstDash val="dash"/>
+              </a:ln>
+            </p:spPr>
+            <p:style>
+              <a:lnRef idx="1">
+                <a:schemeClr val="accent1"/>
+              </a:lnRef>
+              <a:fillRef idx="0">
+                <a:schemeClr val="accent1"/>
+              </a:fillRef>
+              <a:effectRef idx="0">
+                <a:schemeClr val="accent1"/>
+              </a:effectRef>
+              <a:fontRef idx="minor">
+                <a:schemeClr val="tx1"/>
+              </a:fontRef>
+            </p:style>
+          </p:cxnSp>
+          <p:cxnSp>
+            <p:nvCxnSpPr>
+              <p:cNvPr id="121" name="Straight Connector 120"/>
+              <p:cNvCxnSpPr/>
+              <p:nvPr/>
+            </p:nvCxnSpPr>
+            <p:spPr>
+              <a:xfrm>
+                <a:off x="10160835" y="3311159"/>
+                <a:ext cx="0" cy="370800"/>
+              </a:xfrm>
+              <a:prstGeom prst="line">
+                <a:avLst/>
+              </a:prstGeom>
+              <a:ln w="9525">
+                <a:solidFill>
+                  <a:schemeClr val="tx1"/>
+                </a:solidFill>
+                <a:prstDash val="dash"/>
+              </a:ln>
+            </p:spPr>
+            <p:style>
+              <a:lnRef idx="1">
+                <a:schemeClr val="accent1"/>
+              </a:lnRef>
+              <a:fillRef idx="0">
+                <a:schemeClr val="accent1"/>
+              </a:fillRef>
+              <a:effectRef idx="0">
+                <a:schemeClr val="accent1"/>
+              </a:effectRef>
+              <a:fontRef idx="minor">
+                <a:schemeClr val="tx1"/>
+              </a:fontRef>
+            </p:style>
+          </p:cxnSp>
+          <p:cxnSp>
+            <p:nvCxnSpPr>
+              <p:cNvPr id="122" name="Straight Connector 121"/>
+              <p:cNvCxnSpPr/>
+              <p:nvPr/>
+            </p:nvCxnSpPr>
+            <p:spPr>
+              <a:xfrm>
+                <a:off x="10511673" y="3312627"/>
+                <a:ext cx="0" cy="370800"/>
+              </a:xfrm>
+              <a:prstGeom prst="line">
+                <a:avLst/>
+              </a:prstGeom>
+              <a:ln w="9525">
+                <a:solidFill>
+                  <a:schemeClr val="tx1"/>
+                </a:solidFill>
+                <a:prstDash val="dash"/>
+              </a:ln>
+            </p:spPr>
+            <p:style>
+              <a:lnRef idx="1">
+                <a:schemeClr val="accent1"/>
+              </a:lnRef>
+              <a:fillRef idx="0">
+                <a:schemeClr val="accent1"/>
+              </a:fillRef>
+              <a:effectRef idx="0">
+                <a:schemeClr val="accent1"/>
+              </a:effectRef>
+              <a:fontRef idx="minor">
+                <a:schemeClr val="tx1"/>
+              </a:fontRef>
+            </p:style>
+          </p:cxnSp>
+          <p:cxnSp>
+            <p:nvCxnSpPr>
+              <p:cNvPr id="123" name="Straight Connector 122"/>
+              <p:cNvCxnSpPr/>
+              <p:nvPr/>
+            </p:nvCxnSpPr>
+            <p:spPr>
+              <a:xfrm>
+                <a:off x="10737098" y="3311159"/>
+                <a:ext cx="0" cy="370800"/>
+              </a:xfrm>
+              <a:prstGeom prst="line">
+                <a:avLst/>
+              </a:prstGeom>
+              <a:ln w="9525">
+                <a:solidFill>
+                  <a:schemeClr val="tx1"/>
+                </a:solidFill>
+                <a:prstDash val="dash"/>
+              </a:ln>
+            </p:spPr>
+            <p:style>
+              <a:lnRef idx="1">
+                <a:schemeClr val="accent1"/>
+              </a:lnRef>
+              <a:fillRef idx="0">
+                <a:schemeClr val="accent1"/>
+              </a:fillRef>
+              <a:effectRef idx="0">
+                <a:schemeClr val="accent1"/>
+              </a:effectRef>
+              <a:fontRef idx="minor">
+                <a:schemeClr val="tx1"/>
+              </a:fontRef>
+            </p:style>
+          </p:cxnSp>
+        </p:grpSp>
+        <p:sp>
+          <p:nvSpPr>
+            <p:cNvPr id="105" name="TextBox 104"/>
+            <p:cNvSpPr txBox="1"/>
+            <p:nvPr/>
+          </p:nvSpPr>
+          <p:spPr>
+            <a:xfrm>
+              <a:off x="7324914" y="3503728"/>
+              <a:ext cx="383438" cy="307777"/>
+            </a:xfrm>
+            <a:prstGeom prst="rect">
+              <a:avLst/>
+            </a:prstGeom>
+            <a:noFill/>
+          </p:spPr>
+          <p:txBody>
+            <a:bodyPr wrap="none" rtlCol="0">
+              <a:spAutoFit/>
+            </a:bodyPr>
+            <a:lstStyle/>
+            <a:p>
+              <a:pPr algn="ctr"/>
+              <a:r>
+                <a:rPr lang="en-GB" sz="1400" b="1" dirty="0" smtClean="0">
+                  <a:latin typeface="Arial" panose="020B0604020202020204" pitchFamily="34" charset="0"/>
+                  <a:cs typeface="Arial" panose="020B0604020202020204" pitchFamily="34" charset="0"/>
+                </a:rPr>
+                <a:t>c1</a:t>
+              </a:r>
+              <a:endParaRPr lang="en-GB" sz="1400" b="1" dirty="0">
+                <a:latin typeface="Arial" panose="020B0604020202020204" pitchFamily="34" charset="0"/>
+                <a:cs typeface="Arial" panose="020B0604020202020204" pitchFamily="34" charset="0"/>
+              </a:endParaRPr>
+            </a:p>
+          </p:txBody>
+        </p:sp>
+        <p:sp>
+          <p:nvSpPr>
+            <p:cNvPr id="106" name="TextBox 105"/>
+            <p:cNvSpPr txBox="1"/>
+            <p:nvPr/>
+          </p:nvSpPr>
+          <p:spPr>
+            <a:xfrm>
+              <a:off x="8242337" y="3503727"/>
+              <a:ext cx="383438" cy="307777"/>
+            </a:xfrm>
+            <a:prstGeom prst="rect">
+              <a:avLst/>
+            </a:prstGeom>
+            <a:noFill/>
+          </p:spPr>
+          <p:txBody>
+            <a:bodyPr wrap="none" rtlCol="0">
+              <a:spAutoFit/>
+            </a:bodyPr>
+            <a:lstStyle/>
+            <a:p>
+              <a:pPr algn="ctr"/>
+              <a:r>
+                <a:rPr lang="en-GB" sz="1400" b="1" dirty="0">
+                  <a:latin typeface="Arial" panose="020B0604020202020204" pitchFamily="34" charset="0"/>
+                  <a:cs typeface="Arial" panose="020B0604020202020204" pitchFamily="34" charset="0"/>
+                </a:rPr>
+                <a:t>a</a:t>
+              </a:r>
+              <a:r>
+                <a:rPr lang="en-GB" sz="1400" b="1" dirty="0" smtClean="0">
+                  <a:latin typeface="Arial" panose="020B0604020202020204" pitchFamily="34" charset="0"/>
+                  <a:cs typeface="Arial" panose="020B0604020202020204" pitchFamily="34" charset="0"/>
+                </a:rPr>
+                <a:t>2</a:t>
+              </a:r>
+              <a:endParaRPr lang="en-GB" sz="1400" b="1" dirty="0">
+                <a:latin typeface="Arial" panose="020B0604020202020204" pitchFamily="34" charset="0"/>
+                <a:cs typeface="Arial" panose="020B0604020202020204" pitchFamily="34" charset="0"/>
+              </a:endParaRPr>
+            </a:p>
+          </p:txBody>
+        </p:sp>
+        <p:sp>
+          <p:nvSpPr>
+            <p:cNvPr id="108" name="TextBox 107"/>
+            <p:cNvSpPr txBox="1"/>
+            <p:nvPr/>
+          </p:nvSpPr>
+          <p:spPr>
+            <a:xfrm>
+              <a:off x="8936998" y="3503727"/>
+              <a:ext cx="383438" cy="307777"/>
+            </a:xfrm>
+            <a:prstGeom prst="rect">
+              <a:avLst/>
+            </a:prstGeom>
+            <a:noFill/>
+          </p:spPr>
+          <p:txBody>
+            <a:bodyPr wrap="none" rtlCol="0">
+              <a:spAutoFit/>
+            </a:bodyPr>
+            <a:lstStyle/>
+            <a:p>
+              <a:pPr algn="ctr"/>
+              <a:r>
+                <a:rPr lang="en-GB" sz="1400" b="1" dirty="0" smtClean="0">
+                  <a:latin typeface="Arial" panose="020B0604020202020204" pitchFamily="34" charset="0"/>
+                  <a:cs typeface="Arial" panose="020B0604020202020204" pitchFamily="34" charset="0"/>
+                </a:rPr>
+                <a:t>a3</a:t>
+              </a:r>
+              <a:endParaRPr lang="en-GB" sz="1400" b="1" dirty="0">
+                <a:latin typeface="Arial" panose="020B0604020202020204" pitchFamily="34" charset="0"/>
+                <a:cs typeface="Arial" panose="020B0604020202020204" pitchFamily="34" charset="0"/>
+              </a:endParaRPr>
+            </a:p>
+          </p:txBody>
+        </p:sp>
+        <p:sp>
+          <p:nvSpPr>
+            <p:cNvPr id="13" name="Freeform 12"/>
+            <p:cNvSpPr/>
+            <p:nvPr/>
+          </p:nvSpPr>
+          <p:spPr>
+            <a:xfrm>
+              <a:off x="6917531" y="3824288"/>
+              <a:ext cx="2564607" cy="376237"/>
+            </a:xfrm>
+            <a:custGeom>
+              <a:avLst/>
+              <a:gdLst>
+                <a:gd name="connsiteX0" fmla="*/ 33338 w 2564607"/>
+                <a:gd name="connsiteY0" fmla="*/ 0 h 376237"/>
+                <a:gd name="connsiteX1" fmla="*/ 2564607 w 2564607"/>
+                <a:gd name="connsiteY1" fmla="*/ 2381 h 376237"/>
+                <a:gd name="connsiteX2" fmla="*/ 2562225 w 2564607"/>
+                <a:gd name="connsiteY2" fmla="*/ 376237 h 376237"/>
+                <a:gd name="connsiteX3" fmla="*/ 30957 w 2564607"/>
+                <a:gd name="connsiteY3" fmla="*/ 371475 h 376237"/>
+                <a:gd name="connsiteX4" fmla="*/ 0 w 2564607"/>
+                <a:gd name="connsiteY4" fmla="*/ 311943 h 376237"/>
+                <a:gd name="connsiteX5" fmla="*/ 57150 w 2564607"/>
+                <a:gd name="connsiteY5" fmla="*/ 247650 h 376237"/>
+                <a:gd name="connsiteX6" fmla="*/ 19050 w 2564607"/>
+                <a:gd name="connsiteY6" fmla="*/ 164306 h 376237"/>
+                <a:gd name="connsiteX7" fmla="*/ 57150 w 2564607"/>
+                <a:gd name="connsiteY7" fmla="*/ 97631 h 376237"/>
+                <a:gd name="connsiteX8" fmla="*/ 33338 w 2564607"/>
+                <a:gd name="connsiteY8" fmla="*/ 0 h 376237"/>
+              </a:gdLst>
+              <a:ahLst/>
+              <a:cxnLst>
+                <a:cxn ang="0">
+                  <a:pos x="connsiteX0" y="connsiteY0"/>
+                </a:cxn>
+                <a:cxn ang="0">
+                  <a:pos x="connsiteX1" y="connsiteY1"/>
+                </a:cxn>
+                <a:cxn ang="0">
+                  <a:pos x="connsiteX2" y="connsiteY2"/>
+                </a:cxn>
+                <a:cxn ang="0">
+                  <a:pos x="connsiteX3" y="connsiteY3"/>
+                </a:cxn>
+                <a:cxn ang="0">
+                  <a:pos x="connsiteX4" y="connsiteY4"/>
+                </a:cxn>
+                <a:cxn ang="0">
+                  <a:pos x="connsiteX5" y="connsiteY5"/>
+                </a:cxn>
+                <a:cxn ang="0">
+                  <a:pos x="connsiteX6" y="connsiteY6"/>
+                </a:cxn>
+                <a:cxn ang="0">
+                  <a:pos x="connsiteX7" y="connsiteY7"/>
+                </a:cxn>
+                <a:cxn ang="0">
+                  <a:pos x="connsiteX8" y="connsiteY8"/>
+                </a:cxn>
+              </a:cxnLst>
+              <a:rect l="l" t="t" r="r" b="b"/>
+              <a:pathLst>
+                <a:path w="2564607" h="376237">
+                  <a:moveTo>
+                    <a:pt x="33338" y="0"/>
+                  </a:moveTo>
+                  <a:lnTo>
+                    <a:pt x="2564607" y="2381"/>
+                  </a:lnTo>
+                  <a:lnTo>
+                    <a:pt x="2562225" y="376237"/>
+                  </a:lnTo>
+                  <a:lnTo>
+                    <a:pt x="30957" y="371475"/>
+                  </a:lnTo>
+                  <a:lnTo>
+                    <a:pt x="0" y="311943"/>
+                  </a:lnTo>
+                  <a:lnTo>
+                    <a:pt x="57150" y="247650"/>
+                  </a:lnTo>
+                  <a:lnTo>
+                    <a:pt x="19050" y="164306"/>
+                  </a:lnTo>
+                  <a:lnTo>
+                    <a:pt x="57150" y="97631"/>
+                  </a:lnTo>
+                  <a:lnTo>
+                    <a:pt x="33338" y="0"/>
+                  </a:lnTo>
+                  <a:close/>
+                </a:path>
+              </a:pathLst>
+            </a:custGeom>
+            <a:noFill/>
+            <a:ln w="19050">
+              <a:solidFill>
+                <a:schemeClr val="tx1"/>
+              </a:solidFill>
+            </a:ln>
+          </p:spPr>
+          <p:style>
+            <a:lnRef idx="2">
+              <a:schemeClr val="accent1">
+                <a:shade val="50000"/>
+              </a:schemeClr>
+            </a:lnRef>
+            <a:fillRef idx="1">
+              <a:schemeClr val="accent1"/>
+            </a:fillRef>
+            <a:effectRef idx="0">
+              <a:schemeClr val="accent1"/>
+            </a:effectRef>
+            <a:fontRef idx="minor">
+              <a:schemeClr val="lt1"/>
+            </a:fontRef>
+          </p:style>
+          <p:txBody>
+            <a:bodyPr rtlCol="0" anchor="ctr"/>
+            <a:lstStyle/>
+            <a:p>
+              <a:pPr algn="ctr"/>
+              <a:endParaRPr lang="en-GB"/>
+            </a:p>
+          </p:txBody>
+        </p:sp>
+      </p:grpSp>
+      <p:grpSp>
+        <p:nvGrpSpPr>
+          <p:cNvPr id="44" name="Group 43"/>
+          <p:cNvGrpSpPr/>
+          <p:nvPr/>
+        </p:nvGrpSpPr>
+        <p:grpSpPr>
+          <a:xfrm>
+            <a:off x="6712944" y="2148449"/>
+            <a:ext cx="4612048" cy="2594664"/>
+            <a:chOff x="6712944" y="2148449"/>
+            <a:chExt cx="4612048" cy="2594664"/>
+          </a:xfrm>
+        </p:grpSpPr>
+        <p:cxnSp>
+          <p:nvCxnSpPr>
+            <p:cNvPr id="125" name="Straight Connector 124"/>
+            <p:cNvCxnSpPr>
+              <a:stCxn id="139" idx="3"/>
+              <a:endCxn id="135" idx="1"/>
+            </p:cNvCxnSpPr>
+            <p:nvPr/>
+          </p:nvCxnSpPr>
+          <p:spPr>
+            <a:xfrm>
+              <a:off x="8851156" y="3131416"/>
+              <a:ext cx="580369" cy="0"/>
+            </a:xfrm>
+            <a:prstGeom prst="straightConnector1">
+              <a:avLst/>
+            </a:prstGeom>
+            <a:ln w="19050">
+              <a:solidFill>
+                <a:schemeClr val="tx1"/>
+              </a:solidFill>
+            </a:ln>
+            <a:effectLst>
+              <a:outerShdw blurRad="50800" dist="38100" dir="2700000" algn="tl" rotWithShape="0">
+                <a:prstClr val="black">
+                  <a:alpha val="40000"/>
+                </a:prstClr>
+              </a:outerShdw>
+            </a:effectLst>
+          </p:spPr>
+          <p:style>
+            <a:lnRef idx="1">
+              <a:schemeClr val="accent1"/>
+            </a:lnRef>
+            <a:fillRef idx="0">
+              <a:schemeClr val="accent1"/>
+            </a:fillRef>
+            <a:effectRef idx="0">
+              <a:schemeClr val="accent1"/>
+            </a:effectRef>
+            <a:fontRef idx="minor">
+              <a:schemeClr val="tx1"/>
+            </a:fontRef>
+          </p:style>
+        </p:cxnSp>
+        <p:grpSp>
+          <p:nvGrpSpPr>
+            <p:cNvPr id="126" name="Group 125"/>
+            <p:cNvGrpSpPr/>
+            <p:nvPr/>
+          </p:nvGrpSpPr>
+          <p:grpSpPr>
+            <a:xfrm>
+              <a:off x="6712944" y="2671715"/>
+              <a:ext cx="2138212" cy="919401"/>
+              <a:chOff x="2000083" y="1563410"/>
+              <a:chExt cx="2138212" cy="919401"/>
+            </a:xfrm>
+          </p:grpSpPr>
+          <p:sp>
+            <p:nvSpPr>
+              <p:cNvPr id="139" name="Rounded Rectangle 138"/>
+              <p:cNvSpPr/>
+              <p:nvPr/>
+            </p:nvSpPr>
+            <p:spPr>
+              <a:xfrm>
+                <a:off x="2000083" y="1563410"/>
+                <a:ext cx="2138212" cy="919401"/>
+              </a:xfrm>
+              <a:prstGeom prst="roundRect">
+                <a:avLst/>
+              </a:prstGeom>
+              <a:ln w="19050"/>
+              <a:effectLst>
+                <a:outerShdw blurRad="50800" dist="38100" dir="2700000" algn="tl" rotWithShape="0">
+                  <a:prstClr val="black">
+                    <a:alpha val="40000"/>
+                  </a:prstClr>
+                </a:outerShdw>
+              </a:effectLst>
+            </p:spPr>
+            <p:style>
+              <a:lnRef idx="2">
+                <a:schemeClr val="dk1"/>
+              </a:lnRef>
+              <a:fillRef idx="1">
+                <a:schemeClr val="lt1"/>
+              </a:fillRef>
+              <a:effectRef idx="0">
+                <a:schemeClr val="dk1"/>
+              </a:effectRef>
+              <a:fontRef idx="minor">
+                <a:schemeClr val="dk1"/>
+              </a:fontRef>
+            </p:style>
+            <p:txBody>
+              <a:bodyPr wrap="none" rtlCol="0" anchor="ctr">
+                <a:spAutoFit/>
+              </a:bodyPr>
+              <a:lstStyle/>
+              <a:p>
+                <a:pPr algn="ctr"/>
+                <a:r>
+                  <a:rPr lang="en-GB" sz="1600" b="1" dirty="0" smtClean="0">
+                    <a:latin typeface="Arial" panose="020B0604020202020204" pitchFamily="34" charset="0"/>
+                    <a:cs typeface="Arial" panose="020B0604020202020204" pitchFamily="34" charset="0"/>
+                  </a:rPr>
+                  <a:t>c1 : Cage</a:t>
+                </a:r>
+              </a:p>
+              <a:p>
+                <a:r>
+                  <a:rPr lang="en-GB" sz="1600" dirty="0" err="1" smtClean="0">
+                    <a:latin typeface="Arial" panose="020B0604020202020204" pitchFamily="34" charset="0"/>
+                    <a:cs typeface="Arial" panose="020B0604020202020204" pitchFamily="34" charset="0"/>
+                  </a:rPr>
+                  <a:t>totalSpace</a:t>
+                </a:r>
+                <a:r>
+                  <a:rPr lang="en-GB" sz="1600" dirty="0" smtClean="0">
+                    <a:latin typeface="Arial" panose="020B0604020202020204" pitchFamily="34" charset="0"/>
+                    <a:cs typeface="Arial" panose="020B0604020202020204" pitchFamily="34" charset="0"/>
+                  </a:rPr>
+                  <a:t> = 5</a:t>
+                </a:r>
+              </a:p>
+              <a:p>
+                <a:r>
+                  <a:rPr lang="en-GB" sz="1600" dirty="0" err="1" smtClean="0">
+                    <a:latin typeface="Arial" panose="020B0604020202020204" pitchFamily="34" charset="0"/>
+                    <a:cs typeface="Arial" panose="020B0604020202020204" pitchFamily="34" charset="0"/>
+                  </a:rPr>
+                  <a:t>spaceRemaining</a:t>
+                </a:r>
+                <a:r>
+                  <a:rPr lang="en-GB" sz="1600" dirty="0" smtClean="0">
+                    <a:latin typeface="Arial" panose="020B0604020202020204" pitchFamily="34" charset="0"/>
+                    <a:cs typeface="Arial" panose="020B0604020202020204" pitchFamily="34" charset="0"/>
+                  </a:rPr>
+                  <a:t> = 3</a:t>
+                </a:r>
+                <a:endParaRPr lang="en-GB" sz="1600" dirty="0">
+                  <a:latin typeface="Arial" panose="020B0604020202020204" pitchFamily="34" charset="0"/>
+                  <a:cs typeface="Arial" panose="020B0604020202020204" pitchFamily="34" charset="0"/>
+                </a:endParaRPr>
+              </a:p>
+            </p:txBody>
+          </p:sp>
+          <p:cxnSp>
+            <p:nvCxnSpPr>
+              <p:cNvPr id="140" name="Straight Connector 139"/>
+              <p:cNvCxnSpPr/>
+              <p:nvPr/>
+            </p:nvCxnSpPr>
+            <p:spPr>
+              <a:xfrm>
+                <a:off x="2019863" y="1917518"/>
+                <a:ext cx="2098651" cy="0"/>
+              </a:xfrm>
+              <a:prstGeom prst="line">
+                <a:avLst/>
+              </a:prstGeom>
+              <a:ln w="19050">
+                <a:solidFill>
+                  <a:schemeClr val="tx1"/>
+                </a:solidFill>
+              </a:ln>
+              <a:effectLst/>
+            </p:spPr>
+            <p:style>
+              <a:lnRef idx="1">
+                <a:schemeClr val="accent1"/>
+              </a:lnRef>
+              <a:fillRef idx="0">
+                <a:schemeClr val="accent1"/>
+              </a:fillRef>
+              <a:effectRef idx="0">
+                <a:schemeClr val="accent1"/>
+              </a:effectRef>
+              <a:fontRef idx="minor">
+                <a:schemeClr val="tx1"/>
+              </a:fontRef>
+            </p:style>
+          </p:cxnSp>
+        </p:grpSp>
+        <p:grpSp>
+          <p:nvGrpSpPr>
+            <p:cNvPr id="128" name="Group 127"/>
+            <p:cNvGrpSpPr/>
+            <p:nvPr/>
+          </p:nvGrpSpPr>
+          <p:grpSpPr>
+            <a:xfrm>
+              <a:off x="9423529" y="2671715"/>
+              <a:ext cx="1893467" cy="919401"/>
+              <a:chOff x="4993156" y="1564692"/>
+              <a:chExt cx="1893467" cy="919401"/>
+            </a:xfrm>
+          </p:grpSpPr>
+          <p:sp>
+            <p:nvSpPr>
+              <p:cNvPr id="135" name="Rounded Rectangle 134"/>
+              <p:cNvSpPr/>
+              <p:nvPr/>
+            </p:nvSpPr>
+            <p:spPr>
+              <a:xfrm>
+                <a:off x="5001152" y="1564692"/>
+                <a:ext cx="1877474" cy="919401"/>
+              </a:xfrm>
+              <a:prstGeom prst="roundRect">
+                <a:avLst/>
+              </a:prstGeom>
+              <a:ln w="19050"/>
+              <a:effectLst>
+                <a:outerShdw blurRad="50800" dist="38100" dir="2700000" algn="tl" rotWithShape="0">
+                  <a:prstClr val="black">
+                    <a:alpha val="40000"/>
+                  </a:prstClr>
+                </a:outerShdw>
+              </a:effectLst>
+            </p:spPr>
+            <p:style>
+              <a:lnRef idx="2">
+                <a:schemeClr val="dk1"/>
+              </a:lnRef>
+              <a:fillRef idx="1">
+                <a:schemeClr val="lt1"/>
+              </a:fillRef>
+              <a:effectRef idx="0">
+                <a:schemeClr val="dk1"/>
+              </a:effectRef>
+              <a:fontRef idx="minor">
+                <a:schemeClr val="dk1"/>
+              </a:fontRef>
+            </p:style>
+            <p:txBody>
+              <a:bodyPr wrap="none" rtlCol="0" anchor="ctr">
+                <a:spAutoFit/>
+              </a:bodyPr>
+              <a:lstStyle/>
+              <a:p>
+                <a:pPr algn="ctr"/>
+                <a:r>
+                  <a:rPr lang="en-GB" sz="1600" b="1" dirty="0" smtClean="0">
+                    <a:latin typeface="Arial" panose="020B0604020202020204" pitchFamily="34" charset="0"/>
+                    <a:cs typeface="Arial" panose="020B0604020202020204" pitchFamily="34" charset="0"/>
+                  </a:rPr>
+                  <a:t>a2 : Animal</a:t>
+                </a:r>
+              </a:p>
+              <a:p>
+                <a:r>
+                  <a:rPr lang="en-GB" sz="1600" dirty="0" smtClean="0">
+                    <a:latin typeface="Arial" panose="020B0604020202020204" pitchFamily="34" charset="0"/>
+                    <a:cs typeface="Arial" panose="020B0604020202020204" pitchFamily="34" charset="0"/>
+                  </a:rPr>
+                  <a:t>count : 1</a:t>
+                </a:r>
+              </a:p>
+              <a:p>
+                <a:r>
+                  <a:rPr lang="en-GB" sz="1600" dirty="0" err="1" smtClean="0">
+                    <a:latin typeface="Arial" panose="020B0604020202020204" pitchFamily="34" charset="0"/>
+                    <a:cs typeface="Arial" panose="020B0604020202020204" pitchFamily="34" charset="0"/>
+                  </a:rPr>
+                  <a:t>spaceRequired</a:t>
+                </a:r>
+                <a:r>
+                  <a:rPr lang="en-GB" sz="1600" dirty="0" smtClean="0">
+                    <a:latin typeface="Arial" panose="020B0604020202020204" pitchFamily="34" charset="0"/>
+                    <a:cs typeface="Arial" panose="020B0604020202020204" pitchFamily="34" charset="0"/>
+                  </a:rPr>
+                  <a:t>: </a:t>
+                </a:r>
+                <a:r>
+                  <a:rPr lang="en-GB" sz="1600" dirty="0" smtClean="0">
+                    <a:latin typeface="Arial" panose="020B0604020202020204" pitchFamily="34" charset="0"/>
+                    <a:cs typeface="Arial" panose="020B0604020202020204" pitchFamily="34" charset="0"/>
+                  </a:rPr>
+                  <a:t>1</a:t>
+                </a:r>
+                <a:endParaRPr lang="en-GB" sz="1600" dirty="0">
+                  <a:latin typeface="Arial" panose="020B0604020202020204" pitchFamily="34" charset="0"/>
+                  <a:cs typeface="Arial" panose="020B0604020202020204" pitchFamily="34" charset="0"/>
+                </a:endParaRPr>
+              </a:p>
+            </p:txBody>
+          </p:sp>
+          <p:cxnSp>
+            <p:nvCxnSpPr>
+              <p:cNvPr id="136" name="Straight Connector 135"/>
+              <p:cNvCxnSpPr/>
+              <p:nvPr/>
+            </p:nvCxnSpPr>
+            <p:spPr>
+              <a:xfrm>
+                <a:off x="4993156" y="1917518"/>
+                <a:ext cx="1893467" cy="0"/>
+              </a:xfrm>
+              <a:prstGeom prst="line">
+                <a:avLst/>
+              </a:prstGeom>
+              <a:ln w="19050">
+                <a:solidFill>
+                  <a:schemeClr val="tx1"/>
+                </a:solidFill>
+              </a:ln>
+              <a:effectLst/>
+            </p:spPr>
+            <p:style>
+              <a:lnRef idx="1">
+                <a:schemeClr val="accent1"/>
+              </a:lnRef>
+              <a:fillRef idx="0">
+                <a:schemeClr val="accent1"/>
+              </a:fillRef>
+              <a:effectRef idx="0">
+                <a:schemeClr val="accent1"/>
+              </a:effectRef>
+              <a:fontRef idx="minor">
+                <a:schemeClr val="tx1"/>
+              </a:fontRef>
+            </p:style>
+          </p:cxnSp>
+        </p:grpSp>
+        <p:cxnSp>
+          <p:nvCxnSpPr>
+            <p:cNvPr id="129" name="Straight Connector 72"/>
+            <p:cNvCxnSpPr>
+              <a:stCxn id="139" idx="3"/>
+              <a:endCxn id="133" idx="1"/>
+            </p:cNvCxnSpPr>
+            <p:nvPr/>
+          </p:nvCxnSpPr>
+          <p:spPr>
+            <a:xfrm>
+              <a:off x="8851156" y="3131416"/>
+              <a:ext cx="588365" cy="1151997"/>
+            </a:xfrm>
+            <a:prstGeom prst="bentConnector3">
+              <a:avLst>
+                <a:gd name="adj1" fmla="val 50000"/>
+              </a:avLst>
+            </a:prstGeom>
+            <a:ln w="19050">
+              <a:solidFill>
+                <a:schemeClr val="tx1"/>
+              </a:solidFill>
+            </a:ln>
+            <a:effectLst>
+              <a:outerShdw blurRad="50800" dist="38100" dir="2700000" algn="tl" rotWithShape="0">
+                <a:prstClr val="black">
+                  <a:alpha val="40000"/>
+                </a:prstClr>
+              </a:outerShdw>
+            </a:effectLst>
+          </p:spPr>
+          <p:style>
+            <a:lnRef idx="1">
+              <a:schemeClr val="accent1"/>
+            </a:lnRef>
+            <a:fillRef idx="0">
+              <a:schemeClr val="accent1"/>
+            </a:fillRef>
+            <a:effectRef idx="0">
+              <a:schemeClr val="accent1"/>
+            </a:effectRef>
+            <a:fontRef idx="minor">
+              <a:schemeClr val="tx1"/>
+            </a:fontRef>
+          </p:style>
+        </p:cxnSp>
+        <p:grpSp>
+          <p:nvGrpSpPr>
+            <p:cNvPr id="130" name="Group 129"/>
+            <p:cNvGrpSpPr/>
+            <p:nvPr/>
+          </p:nvGrpSpPr>
+          <p:grpSpPr>
+            <a:xfrm>
+              <a:off x="9431525" y="3823712"/>
+              <a:ext cx="1893467" cy="919401"/>
+              <a:chOff x="4993156" y="1564692"/>
+              <a:chExt cx="1893467" cy="919401"/>
+            </a:xfrm>
+          </p:grpSpPr>
+          <p:sp>
+            <p:nvSpPr>
+              <p:cNvPr id="133" name="Rounded Rectangle 132"/>
+              <p:cNvSpPr/>
+              <p:nvPr/>
+            </p:nvSpPr>
+            <p:spPr>
+              <a:xfrm>
+                <a:off x="5001152" y="1564692"/>
+                <a:ext cx="1877474" cy="919401"/>
+              </a:xfrm>
+              <a:prstGeom prst="roundRect">
+                <a:avLst/>
+              </a:prstGeom>
+              <a:ln w="19050"/>
+              <a:effectLst>
+                <a:outerShdw blurRad="50800" dist="38100" dir="2700000" algn="tl" rotWithShape="0">
+                  <a:prstClr val="black">
+                    <a:alpha val="40000"/>
+                  </a:prstClr>
+                </a:outerShdw>
+              </a:effectLst>
+            </p:spPr>
+            <p:style>
+              <a:lnRef idx="2">
+                <a:schemeClr val="dk1"/>
+              </a:lnRef>
+              <a:fillRef idx="1">
+                <a:schemeClr val="lt1"/>
+              </a:fillRef>
+              <a:effectRef idx="0">
+                <a:schemeClr val="dk1"/>
+              </a:effectRef>
+              <a:fontRef idx="minor">
+                <a:schemeClr val="dk1"/>
+              </a:fontRef>
+            </p:style>
+            <p:txBody>
+              <a:bodyPr wrap="none" rtlCol="0" anchor="ctr">
+                <a:spAutoFit/>
+              </a:bodyPr>
+              <a:lstStyle/>
+              <a:p>
+                <a:pPr algn="ctr"/>
+                <a:r>
+                  <a:rPr lang="en-GB" sz="1600" b="1" dirty="0" smtClean="0">
+                    <a:latin typeface="Arial" panose="020B0604020202020204" pitchFamily="34" charset="0"/>
+                    <a:cs typeface="Arial" panose="020B0604020202020204" pitchFamily="34" charset="0"/>
+                  </a:rPr>
+                  <a:t>a3 </a:t>
+                </a:r>
+                <a:r>
+                  <a:rPr lang="en-GB" sz="1600" b="1" dirty="0" smtClean="0">
+                    <a:latin typeface="Arial" panose="020B0604020202020204" pitchFamily="34" charset="0"/>
+                    <a:cs typeface="Arial" panose="020B0604020202020204" pitchFamily="34" charset="0"/>
+                  </a:rPr>
+                  <a:t>: Animal</a:t>
+                </a:r>
+              </a:p>
+              <a:p>
+                <a:r>
+                  <a:rPr lang="en-GB" sz="1600" dirty="0" smtClean="0">
+                    <a:latin typeface="Arial" panose="020B0604020202020204" pitchFamily="34" charset="0"/>
+                    <a:cs typeface="Arial" panose="020B0604020202020204" pitchFamily="34" charset="0"/>
+                  </a:rPr>
+                  <a:t>count : 1</a:t>
+                </a:r>
+              </a:p>
+              <a:p>
+                <a:r>
+                  <a:rPr lang="en-GB" sz="1600" dirty="0" err="1" smtClean="0">
+                    <a:latin typeface="Arial" panose="020B0604020202020204" pitchFamily="34" charset="0"/>
+                    <a:cs typeface="Arial" panose="020B0604020202020204" pitchFamily="34" charset="0"/>
+                  </a:rPr>
+                  <a:t>spaceRequired</a:t>
+                </a:r>
+                <a:r>
+                  <a:rPr lang="en-GB" sz="1600" dirty="0" smtClean="0">
+                    <a:latin typeface="Arial" panose="020B0604020202020204" pitchFamily="34" charset="0"/>
+                    <a:cs typeface="Arial" panose="020B0604020202020204" pitchFamily="34" charset="0"/>
+                  </a:rPr>
+                  <a:t>: 2</a:t>
+                </a:r>
+                <a:endParaRPr lang="en-GB" sz="1600" dirty="0">
+                  <a:latin typeface="Arial" panose="020B0604020202020204" pitchFamily="34" charset="0"/>
+                  <a:cs typeface="Arial" panose="020B0604020202020204" pitchFamily="34" charset="0"/>
+                </a:endParaRPr>
+              </a:p>
+            </p:txBody>
+          </p:sp>
+          <p:cxnSp>
+            <p:nvCxnSpPr>
+              <p:cNvPr id="134" name="Straight Connector 133"/>
+              <p:cNvCxnSpPr/>
+              <p:nvPr/>
+            </p:nvCxnSpPr>
+            <p:spPr>
+              <a:xfrm>
+                <a:off x="4993156" y="1917518"/>
+                <a:ext cx="1893467" cy="0"/>
+              </a:xfrm>
+              <a:prstGeom prst="line">
+                <a:avLst/>
+              </a:prstGeom>
+              <a:ln w="19050">
+                <a:solidFill>
+                  <a:schemeClr val="tx1"/>
+                </a:solidFill>
+              </a:ln>
+              <a:effectLst/>
+            </p:spPr>
+            <p:style>
+              <a:lnRef idx="1">
+                <a:schemeClr val="accent1"/>
+              </a:lnRef>
+              <a:fillRef idx="0">
+                <a:schemeClr val="accent1"/>
+              </a:fillRef>
+              <a:effectRef idx="0">
+                <a:schemeClr val="accent1"/>
+              </a:effectRef>
+              <a:fontRef idx="minor">
+                <a:schemeClr val="tx1"/>
+              </a:fontRef>
+            </p:style>
+          </p:cxnSp>
+        </p:grpSp>
+        <p:cxnSp>
+          <p:nvCxnSpPr>
+            <p:cNvPr id="131" name="Straight Connector 130"/>
+            <p:cNvCxnSpPr>
+              <a:stCxn id="135" idx="3"/>
+              <a:endCxn id="135" idx="0"/>
+            </p:cNvCxnSpPr>
+            <p:nvPr/>
+          </p:nvCxnSpPr>
+          <p:spPr>
+            <a:xfrm flipH="1" flipV="1">
+              <a:off x="10370262" y="2671715"/>
+              <a:ext cx="938737" cy="459701"/>
+            </a:xfrm>
+            <a:prstGeom prst="bentConnector4">
+              <a:avLst>
+                <a:gd name="adj1" fmla="val -24352"/>
+                <a:gd name="adj2" fmla="val 149728"/>
+              </a:avLst>
+            </a:prstGeom>
+            <a:ln w="19050">
+              <a:solidFill>
+                <a:schemeClr val="tx1"/>
+              </a:solidFill>
+            </a:ln>
+            <a:effectLst>
+              <a:outerShdw blurRad="50800" dist="38100" dir="2700000" algn="tl" rotWithShape="0">
+                <a:prstClr val="black">
+                  <a:alpha val="40000"/>
+                </a:prstClr>
+              </a:outerShdw>
+            </a:effectLst>
+          </p:spPr>
+          <p:style>
+            <a:lnRef idx="1">
+              <a:schemeClr val="accent1"/>
+            </a:lnRef>
+            <a:fillRef idx="0">
+              <a:schemeClr val="accent1"/>
+            </a:fillRef>
+            <a:effectRef idx="0">
+              <a:schemeClr val="accent1"/>
+            </a:effectRef>
+            <a:fontRef idx="minor">
+              <a:schemeClr val="tx1"/>
+            </a:fontRef>
+          </p:style>
+        </p:cxnSp>
+        <p:sp>
+          <p:nvSpPr>
+            <p:cNvPr id="132" name="Rectangle 131"/>
+            <p:cNvSpPr/>
+            <p:nvPr/>
+          </p:nvSpPr>
+          <p:spPr>
+            <a:xfrm>
+              <a:off x="10370262" y="2148449"/>
+              <a:ext cx="522900" cy="307777"/>
+            </a:xfrm>
+            <a:prstGeom prst="rect">
+              <a:avLst/>
+            </a:prstGeom>
+            <a:noFill/>
+            <a:ln w="19050">
+              <a:noFill/>
+            </a:ln>
+            <a:effectLst/>
+          </p:spPr>
+          <p:style>
+            <a:lnRef idx="2">
+              <a:schemeClr val="dk1"/>
+            </a:lnRef>
+            <a:fillRef idx="1">
+              <a:schemeClr val="lt1"/>
+            </a:fillRef>
+            <a:effectRef idx="0">
+              <a:schemeClr val="dk1"/>
+            </a:effectRef>
+            <a:fontRef idx="minor">
+              <a:schemeClr val="dk1"/>
+            </a:fontRef>
+          </p:style>
+          <p:txBody>
+            <a:bodyPr wrap="none" rtlCol="0" anchor="ctr">
+              <a:spAutoFit/>
+            </a:bodyPr>
+            <a:lstStyle/>
+            <a:p>
+              <a:r>
+                <a:rPr lang="en-GB" sz="1400" dirty="0" smtClean="0">
+                  <a:latin typeface="Arial" panose="020B0604020202020204" pitchFamily="34" charset="0"/>
+                  <a:cs typeface="Arial" panose="020B0604020202020204" pitchFamily="34" charset="0"/>
+                </a:rPr>
+                <a:t>eats</a:t>
+              </a:r>
+              <a:endParaRPr lang="en-GB" sz="1400" dirty="0">
+                <a:latin typeface="Arial" panose="020B0604020202020204" pitchFamily="34" charset="0"/>
+                <a:cs typeface="Arial" panose="020B0604020202020204" pitchFamily="34" charset="0"/>
+              </a:endParaRPr>
+            </a:p>
+          </p:txBody>
+        </p:sp>
+      </p:grpSp>
+      <p:cxnSp>
+        <p:nvCxnSpPr>
+          <p:cNvPr id="46" name="Straight Connector 45"/>
+          <p:cNvCxnSpPr/>
+          <p:nvPr/>
+        </p:nvCxnSpPr>
+        <p:spPr>
+          <a:xfrm>
+            <a:off x="6459157" y="2159723"/>
+            <a:ext cx="0" cy="3732194"/>
+          </a:xfrm>
+          <a:prstGeom prst="line">
+            <a:avLst/>
+          </a:prstGeom>
+          <a:ln w="28575">
+            <a:solidFill>
+              <a:schemeClr val="tx1">
+                <a:lumMod val="50000"/>
+                <a:lumOff val="50000"/>
+              </a:schemeClr>
+            </a:solidFill>
+            <a:prstDash val="dash"/>
+          </a:ln>
+        </p:spPr>
+        <p:style>
+          <a:lnRef idx="1">
+            <a:schemeClr val="accent1"/>
+          </a:lnRef>
+          <a:fillRef idx="0">
+            <a:schemeClr val="accent1"/>
+          </a:fillRef>
+          <a:effectRef idx="0">
+            <a:schemeClr val="accent1"/>
+          </a:effectRef>
+          <a:fontRef idx="minor">
+            <a:schemeClr val="tx1"/>
+          </a:fontRef>
+        </p:style>
+      </p:cxnSp>
+      <p:cxnSp>
+        <p:nvCxnSpPr>
+          <p:cNvPr id="141" name="Straight Connector 140"/>
+          <p:cNvCxnSpPr/>
+          <p:nvPr/>
+        </p:nvCxnSpPr>
+        <p:spPr>
+          <a:xfrm flipH="1">
+            <a:off x="159026" y="2159723"/>
+            <a:ext cx="11553246" cy="0"/>
+          </a:xfrm>
+          <a:prstGeom prst="line">
+            <a:avLst/>
+          </a:prstGeom>
+          <a:ln w="28575">
+            <a:solidFill>
+              <a:schemeClr val="tx1">
+                <a:lumMod val="50000"/>
+                <a:lumOff val="50000"/>
+              </a:schemeClr>
+            </a:solidFill>
+            <a:prstDash val="dash"/>
+          </a:ln>
+        </p:spPr>
+        <p:style>
+          <a:lnRef idx="1">
+            <a:schemeClr val="accent1"/>
+          </a:lnRef>
+          <a:fillRef idx="0">
+            <a:schemeClr val="accent1"/>
+          </a:fillRef>
+          <a:effectRef idx="0">
+            <a:schemeClr val="accent1"/>
+          </a:effectRef>
+          <a:fontRef idx="minor">
+            <a:schemeClr val="tx1"/>
+          </a:fontRef>
+        </p:style>
+      </p:cxnSp>
       <p:sp>
         <p:nvSpPr>
-          <p:cNvPr id="63" name="Rounded Rectangle 62"/>
+          <p:cNvPr id="58" name="TextBox 57"/>
+          <p:cNvSpPr txBox="1"/>
+          <p:nvPr/>
+        </p:nvSpPr>
+        <p:spPr>
+          <a:xfrm>
+            <a:off x="163670" y="1877087"/>
+            <a:ext cx="372218" cy="276999"/>
+          </a:xfrm>
+          <a:prstGeom prst="rect">
+            <a:avLst/>
+          </a:prstGeom>
+          <a:noFill/>
+        </p:spPr>
+        <p:txBody>
+          <a:bodyPr wrap="none" rtlCol="0">
+            <a:spAutoFit/>
+          </a:bodyPr>
+          <a:lstStyle/>
+          <a:p>
+            <a:r>
+              <a:rPr lang="en-GB" sz="1200" b="1" dirty="0" smtClean="0">
+                <a:solidFill>
+                  <a:schemeClr val="tx1">
+                    <a:lumMod val="50000"/>
+                    <a:lumOff val="50000"/>
+                  </a:schemeClr>
+                </a:solidFill>
+                <a:latin typeface="Arial" panose="020B0604020202020204" pitchFamily="34" charset="0"/>
+                <a:cs typeface="Arial" panose="020B0604020202020204" pitchFamily="34" charset="0"/>
+              </a:rPr>
+              <a:t>(a)</a:t>
+            </a:r>
+            <a:endParaRPr lang="en-GB" sz="1200" b="1" dirty="0">
+              <a:solidFill>
+                <a:schemeClr val="tx1">
+                  <a:lumMod val="50000"/>
+                  <a:lumOff val="50000"/>
+                </a:schemeClr>
+              </a:solidFill>
+              <a:latin typeface="Arial" panose="020B0604020202020204" pitchFamily="34" charset="0"/>
+              <a:cs typeface="Arial" panose="020B0604020202020204" pitchFamily="34" charset="0"/>
+            </a:endParaRPr>
+          </a:p>
+        </p:txBody>
+      </p:sp>
+      <p:sp>
+        <p:nvSpPr>
+          <p:cNvPr id="142" name="TextBox 141"/>
+          <p:cNvSpPr txBox="1"/>
+          <p:nvPr/>
+        </p:nvSpPr>
+        <p:spPr>
+          <a:xfrm>
+            <a:off x="6086939" y="5611850"/>
+            <a:ext cx="381836" cy="276999"/>
+          </a:xfrm>
+          <a:prstGeom prst="rect">
+            <a:avLst/>
+          </a:prstGeom>
+          <a:noFill/>
+        </p:spPr>
+        <p:txBody>
+          <a:bodyPr wrap="none" rtlCol="0">
+            <a:spAutoFit/>
+          </a:bodyPr>
+          <a:lstStyle/>
+          <a:p>
+            <a:r>
+              <a:rPr lang="en-GB" sz="1200" b="1" dirty="0" smtClean="0">
+                <a:solidFill>
+                  <a:schemeClr val="tx1">
+                    <a:lumMod val="50000"/>
+                    <a:lumOff val="50000"/>
+                  </a:schemeClr>
+                </a:solidFill>
+                <a:latin typeface="Arial" panose="020B0604020202020204" pitchFamily="34" charset="0"/>
+                <a:cs typeface="Arial" panose="020B0604020202020204" pitchFamily="34" charset="0"/>
+              </a:rPr>
+              <a:t>(b)</a:t>
+            </a:r>
+            <a:endParaRPr lang="en-GB" sz="1200" b="1" dirty="0">
+              <a:solidFill>
+                <a:schemeClr val="tx1">
+                  <a:lumMod val="50000"/>
+                  <a:lumOff val="50000"/>
+                </a:schemeClr>
+              </a:solidFill>
+              <a:latin typeface="Arial" panose="020B0604020202020204" pitchFamily="34" charset="0"/>
+              <a:cs typeface="Arial" panose="020B0604020202020204" pitchFamily="34" charset="0"/>
+            </a:endParaRPr>
+          </a:p>
+        </p:txBody>
+      </p:sp>
+      <p:sp>
+        <p:nvSpPr>
+          <p:cNvPr id="143" name="TextBox 142"/>
+          <p:cNvSpPr txBox="1"/>
+          <p:nvPr/>
+        </p:nvSpPr>
+        <p:spPr>
+          <a:xfrm>
+            <a:off x="6459157" y="5608782"/>
+            <a:ext cx="372218" cy="276999"/>
+          </a:xfrm>
+          <a:prstGeom prst="rect">
+            <a:avLst/>
+          </a:prstGeom>
+          <a:noFill/>
+        </p:spPr>
+        <p:txBody>
+          <a:bodyPr wrap="none" rtlCol="0">
+            <a:spAutoFit/>
+          </a:bodyPr>
+          <a:lstStyle/>
+          <a:p>
+            <a:r>
+              <a:rPr lang="en-GB" sz="1200" b="1" dirty="0" smtClean="0">
+                <a:solidFill>
+                  <a:schemeClr val="tx1">
+                    <a:lumMod val="50000"/>
+                    <a:lumOff val="50000"/>
+                  </a:schemeClr>
+                </a:solidFill>
+                <a:latin typeface="Arial" panose="020B0604020202020204" pitchFamily="34" charset="0"/>
+                <a:cs typeface="Arial" panose="020B0604020202020204" pitchFamily="34" charset="0"/>
+              </a:rPr>
+              <a:t>(c)</a:t>
+            </a:r>
+            <a:endParaRPr lang="en-GB" sz="1200" b="1" dirty="0">
+              <a:solidFill>
+                <a:schemeClr val="tx1">
+                  <a:lumMod val="50000"/>
+                  <a:lumOff val="50000"/>
+                </a:schemeClr>
+              </a:solidFill>
+              <a:latin typeface="Arial" panose="020B0604020202020204" pitchFamily="34" charset="0"/>
+              <a:cs typeface="Arial" panose="020B0604020202020204" pitchFamily="34" charset="0"/>
+            </a:endParaRPr>
+          </a:p>
+        </p:txBody>
+      </p:sp>
+    </p:spTree>
+    <p:extLst>
+      <p:ext uri="{BB962C8B-B14F-4D97-AF65-F5344CB8AC3E}">
+        <p14:creationId xmlns:p14="http://schemas.microsoft.com/office/powerpoint/2010/main" val="1512510430"/>
+      </p:ext>
+    </p:extLst>
+  </p:cSld>
+  <p:clrMapOvr>
+    <a:masterClrMapping/>
+  </p:clrMapOvr>
+  <p:timing>
+    <p:tnLst>
+      <p:par>
+        <p:cTn id="1" dur="indefinite" restart="never" nodeType="tmRoot"/>
+      </p:par>
+    </p:tnLst>
+  </p:timing>
+</p:sld>
+</file>
+
+<file path=ppt/slides/slide2.xml><?xml version="1.0" encoding="utf-8"?>
+<p:sld xmlns:a="http://schemas.openxmlformats.org/drawingml/2006/main" xmlns:r="http://schemas.openxmlformats.org/officeDocument/2006/relationships" xmlns:p="http://schemas.openxmlformats.org/presentationml/2006/main">
+  <p:cSld>
+    <p:spTree>
+      <p:nvGrpSpPr>
+        <p:cNvPr id="1" name=""/>
+        <p:cNvGrpSpPr/>
+        <p:nvPr/>
+      </p:nvGrpSpPr>
+      <p:grpSpPr>
+        <a:xfrm>
+          <a:off x="0" y="0"/>
+          <a:ext cx="0" cy="0"/>
+          <a:chOff x="0" y="0"/>
+          <a:chExt cx="0" cy="0"/>
+        </a:xfrm>
+      </p:grpSpPr>
+      <p:grpSp>
+        <p:nvGrpSpPr>
+          <p:cNvPr id="38" name="Group 37"/>
+          <p:cNvGrpSpPr/>
+          <p:nvPr/>
+        </p:nvGrpSpPr>
+        <p:grpSpPr>
+          <a:xfrm>
+            <a:off x="967570" y="729442"/>
+            <a:ext cx="5894981" cy="1611574"/>
+            <a:chOff x="2845168" y="2968618"/>
+            <a:chExt cx="5894981" cy="1611574"/>
+          </a:xfrm>
+        </p:grpSpPr>
+        <p:grpSp>
+          <p:nvGrpSpPr>
+            <p:cNvPr id="27" name="Group 26"/>
+            <p:cNvGrpSpPr/>
+            <p:nvPr/>
+          </p:nvGrpSpPr>
+          <p:grpSpPr>
+            <a:xfrm>
+              <a:off x="2893307" y="2968618"/>
+              <a:ext cx="5571164" cy="1464456"/>
+              <a:chOff x="590240" y="1279317"/>
+              <a:chExt cx="5571164" cy="1464456"/>
+            </a:xfrm>
+          </p:grpSpPr>
+          <p:sp>
+            <p:nvSpPr>
+              <p:cNvPr id="4" name="Rectangle 3"/>
+              <p:cNvSpPr/>
+              <p:nvPr/>
+            </p:nvSpPr>
+            <p:spPr>
+              <a:xfrm>
+                <a:off x="590240" y="1853833"/>
+                <a:ext cx="777777" cy="338554"/>
+              </a:xfrm>
+              <a:prstGeom prst="rect">
+                <a:avLst/>
+              </a:prstGeom>
+              <a:ln w="19050"/>
+              <a:effectLst>
+                <a:outerShdw blurRad="50800" dist="38100" dir="2700000" algn="tl" rotWithShape="0">
+                  <a:prstClr val="black">
+                    <a:alpha val="40000"/>
+                  </a:prstClr>
+                </a:outerShdw>
+              </a:effectLst>
+            </p:spPr>
+            <p:style>
+              <a:lnRef idx="2">
+                <a:schemeClr val="dk1"/>
+              </a:lnRef>
+              <a:fillRef idx="1">
+                <a:schemeClr val="lt1"/>
+              </a:fillRef>
+              <a:effectRef idx="0">
+                <a:schemeClr val="dk1"/>
+              </a:effectRef>
+              <a:fontRef idx="minor">
+                <a:schemeClr val="dk1"/>
+              </a:fontRef>
+            </p:style>
+            <p:txBody>
+              <a:bodyPr wrap="none" rtlCol="0" anchor="ctr">
+                <a:spAutoFit/>
+              </a:bodyPr>
+              <a:lstStyle/>
+              <a:p>
+                <a:pPr algn="ctr"/>
+                <a:r>
+                  <a:rPr lang="en-GB" sz="1600" b="1" dirty="0" smtClean="0">
+                    <a:latin typeface="Arial" panose="020B0604020202020204" pitchFamily="34" charset="0"/>
+                    <a:cs typeface="Arial" panose="020B0604020202020204" pitchFamily="34" charset="0"/>
+                  </a:rPr>
+                  <a:t>Model</a:t>
+                </a:r>
+                <a:endParaRPr lang="en-GB" sz="1600" b="1" dirty="0">
+                  <a:latin typeface="Arial" panose="020B0604020202020204" pitchFamily="34" charset="0"/>
+                  <a:cs typeface="Arial" panose="020B0604020202020204" pitchFamily="34" charset="0"/>
+                </a:endParaRPr>
+              </a:p>
+            </p:txBody>
+          </p:sp>
+          <p:cxnSp>
+            <p:nvCxnSpPr>
+              <p:cNvPr id="10" name="Straight Connector 9"/>
+              <p:cNvCxnSpPr>
+                <a:stCxn id="4" idx="3"/>
+                <a:endCxn id="5" idx="1"/>
+              </p:cNvCxnSpPr>
+              <p:nvPr/>
+            </p:nvCxnSpPr>
+            <p:spPr>
+              <a:xfrm>
+                <a:off x="1368017" y="2023110"/>
+                <a:ext cx="1193661" cy="0"/>
+              </a:xfrm>
+              <a:prstGeom prst="line">
+                <a:avLst/>
+              </a:prstGeom>
+              <a:ln w="19050">
+                <a:solidFill>
+                  <a:schemeClr val="tx1"/>
+                </a:solidFill>
+              </a:ln>
+              <a:effectLst>
+                <a:outerShdw blurRad="50800" dist="38100" dir="2700000" algn="tl" rotWithShape="0">
+                  <a:prstClr val="black">
+                    <a:alpha val="40000"/>
+                  </a:prstClr>
+                </a:outerShdw>
+              </a:effectLst>
+            </p:spPr>
+            <p:style>
+              <a:lnRef idx="1">
+                <a:schemeClr val="accent1"/>
+              </a:lnRef>
+              <a:fillRef idx="0">
+                <a:schemeClr val="accent1"/>
+              </a:fillRef>
+              <a:effectRef idx="0">
+                <a:schemeClr val="accent1"/>
+              </a:effectRef>
+              <a:fontRef idx="minor">
+                <a:schemeClr val="tx1"/>
+              </a:fontRef>
+            </p:style>
+          </p:cxnSp>
+          <p:cxnSp>
+            <p:nvCxnSpPr>
+              <p:cNvPr id="12" name="Straight Connector 11"/>
+              <p:cNvCxnSpPr>
+                <a:stCxn id="5" idx="3"/>
+                <a:endCxn id="6" idx="1"/>
+              </p:cNvCxnSpPr>
+              <p:nvPr/>
+            </p:nvCxnSpPr>
+            <p:spPr>
+              <a:xfrm>
+                <a:off x="3576699" y="2023110"/>
+                <a:ext cx="1377342" cy="1282"/>
+              </a:xfrm>
+              <a:prstGeom prst="line">
+                <a:avLst/>
+              </a:prstGeom>
+              <a:ln w="19050">
+                <a:solidFill>
+                  <a:schemeClr val="tx1"/>
+                </a:solidFill>
+              </a:ln>
+              <a:effectLst>
+                <a:outerShdw blurRad="50800" dist="38100" dir="2700000" algn="tl" rotWithShape="0">
+                  <a:prstClr val="black">
+                    <a:alpha val="40000"/>
+                  </a:prstClr>
+                </a:outerShdw>
+              </a:effectLst>
+            </p:spPr>
+            <p:style>
+              <a:lnRef idx="1">
+                <a:schemeClr val="accent1"/>
+              </a:lnRef>
+              <a:fillRef idx="0">
+                <a:schemeClr val="accent1"/>
+              </a:fillRef>
+              <a:effectRef idx="0">
+                <a:schemeClr val="accent1"/>
+              </a:effectRef>
+              <a:fontRef idx="minor">
+                <a:schemeClr val="tx1"/>
+              </a:fontRef>
+            </p:style>
+          </p:cxnSp>
+          <p:sp>
+            <p:nvSpPr>
+              <p:cNvPr id="17" name="Rectangle 16"/>
+              <p:cNvSpPr/>
+              <p:nvPr/>
+            </p:nvSpPr>
+            <p:spPr>
+              <a:xfrm>
+                <a:off x="5051805" y="1279317"/>
+                <a:ext cx="1109599" cy="307777"/>
+              </a:xfrm>
+              <a:prstGeom prst="rect">
+                <a:avLst/>
+              </a:prstGeom>
+              <a:noFill/>
+              <a:ln w="19050">
+                <a:noFill/>
+              </a:ln>
+              <a:effectLst/>
+            </p:spPr>
+            <p:style>
+              <a:lnRef idx="2">
+                <a:schemeClr val="dk1"/>
+              </a:lnRef>
+              <a:fillRef idx="1">
+                <a:schemeClr val="lt1"/>
+              </a:fillRef>
+              <a:effectRef idx="0">
+                <a:schemeClr val="dk1"/>
+              </a:effectRef>
+              <a:fontRef idx="minor">
+                <a:schemeClr val="dk1"/>
+              </a:fontRef>
+            </p:style>
+            <p:txBody>
+              <a:bodyPr wrap="none" rtlCol="0" anchor="ctr">
+                <a:spAutoFit/>
+              </a:bodyPr>
+              <a:lstStyle/>
+              <a:p>
+                <a:r>
+                  <a:rPr lang="en-GB" sz="1400" dirty="0" err="1" smtClean="0">
+                    <a:latin typeface="Arial" panose="020B0604020202020204" pitchFamily="34" charset="0"/>
+                    <a:cs typeface="Arial" panose="020B0604020202020204" pitchFamily="34" charset="0"/>
+                  </a:rPr>
+                  <a:t>dependsOn</a:t>
+                </a:r>
+                <a:endParaRPr lang="en-GB" sz="1400" dirty="0">
+                  <a:latin typeface="Arial" panose="020B0604020202020204" pitchFamily="34" charset="0"/>
+                  <a:cs typeface="Arial" panose="020B0604020202020204" pitchFamily="34" charset="0"/>
+                </a:endParaRPr>
+              </a:p>
+            </p:txBody>
+          </p:sp>
+          <p:sp>
+            <p:nvSpPr>
+              <p:cNvPr id="5" name="Rectangle 4"/>
+              <p:cNvSpPr/>
+              <p:nvPr/>
+            </p:nvSpPr>
+            <p:spPr>
+              <a:xfrm>
+                <a:off x="2561678" y="1853833"/>
+                <a:ext cx="1015021" cy="338554"/>
+              </a:xfrm>
+              <a:prstGeom prst="rect">
+                <a:avLst/>
+              </a:prstGeom>
+              <a:ln w="19050"/>
+              <a:effectLst>
+                <a:outerShdw blurRad="50800" dist="38100" dir="2700000" algn="tl" rotWithShape="0">
+                  <a:prstClr val="black">
+                    <a:alpha val="40000"/>
+                  </a:prstClr>
+                </a:outerShdw>
+              </a:effectLst>
+            </p:spPr>
+            <p:style>
+              <a:lnRef idx="2">
+                <a:schemeClr val="dk1"/>
+              </a:lnRef>
+              <a:fillRef idx="1">
+                <a:schemeClr val="lt1"/>
+              </a:fillRef>
+              <a:effectRef idx="0">
+                <a:schemeClr val="dk1"/>
+              </a:effectRef>
+              <a:fontRef idx="minor">
+                <a:schemeClr val="dk1"/>
+              </a:fontRef>
+            </p:style>
+            <p:txBody>
+              <a:bodyPr wrap="none" rtlCol="0" anchor="ctr">
+                <a:spAutoFit/>
+              </a:bodyPr>
+              <a:lstStyle/>
+              <a:p>
+                <a:pPr algn="ctr"/>
+                <a:r>
+                  <a:rPr lang="en-GB" sz="1600" b="1" dirty="0" smtClean="0">
+                    <a:latin typeface="Arial" panose="020B0604020202020204" pitchFamily="34" charset="0"/>
+                    <a:cs typeface="Arial" panose="020B0604020202020204" pitchFamily="34" charset="0"/>
+                  </a:rPr>
+                  <a:t>Package</a:t>
+                </a:r>
+                <a:endParaRPr lang="en-GB" sz="1600" b="1" dirty="0" smtClean="0">
+                  <a:latin typeface="Arial" panose="020B0604020202020204" pitchFamily="34" charset="0"/>
+                  <a:cs typeface="Arial" panose="020B0604020202020204" pitchFamily="34" charset="0"/>
+                </a:endParaRPr>
+              </a:p>
+            </p:txBody>
+          </p:sp>
+          <p:grpSp>
+            <p:nvGrpSpPr>
+              <p:cNvPr id="26" name="Group 25"/>
+              <p:cNvGrpSpPr/>
+              <p:nvPr/>
+            </p:nvGrpSpPr>
+            <p:grpSpPr>
+              <a:xfrm>
+                <a:off x="979128" y="1855115"/>
+                <a:ext cx="4706203" cy="338554"/>
+                <a:chOff x="979128" y="1855115"/>
+                <a:chExt cx="4706203" cy="338554"/>
+              </a:xfrm>
+            </p:grpSpPr>
+            <p:sp>
+              <p:nvSpPr>
+                <p:cNvPr id="6" name="Rectangle 5"/>
+                <p:cNvSpPr/>
+                <p:nvPr/>
+              </p:nvSpPr>
+              <p:spPr>
+                <a:xfrm>
+                  <a:off x="4954041" y="1855115"/>
+                  <a:ext cx="731290" cy="338554"/>
+                </a:xfrm>
+                <a:prstGeom prst="rect">
+                  <a:avLst/>
+                </a:prstGeom>
+                <a:ln w="19050"/>
+                <a:effectLst>
+                  <a:outerShdw blurRad="50800" dist="38100" dir="2700000" algn="tl" rotWithShape="0">
+                    <a:prstClr val="black">
+                      <a:alpha val="40000"/>
+                    </a:prstClr>
+                  </a:outerShdw>
+                </a:effectLst>
+              </p:spPr>
+              <p:style>
+                <a:lnRef idx="2">
+                  <a:schemeClr val="dk1"/>
+                </a:lnRef>
+                <a:fillRef idx="1">
+                  <a:schemeClr val="lt1"/>
+                </a:fillRef>
+                <a:effectRef idx="0">
+                  <a:schemeClr val="dk1"/>
+                </a:effectRef>
+                <a:fontRef idx="minor">
+                  <a:schemeClr val="dk1"/>
+                </a:fontRef>
+              </p:style>
+              <p:txBody>
+                <a:bodyPr wrap="none" rtlCol="0" anchor="ctr">
+                  <a:spAutoFit/>
+                </a:bodyPr>
+                <a:lstStyle/>
+                <a:p>
+                  <a:pPr algn="ctr"/>
+                  <a:r>
+                    <a:rPr lang="en-GB" sz="1600" b="1" dirty="0" smtClean="0">
+                      <a:latin typeface="Arial" panose="020B0604020202020204" pitchFamily="34" charset="0"/>
+                      <a:cs typeface="Arial" panose="020B0604020202020204" pitchFamily="34" charset="0"/>
+                    </a:rPr>
+                    <a:t>Class</a:t>
+                  </a:r>
+                  <a:endParaRPr lang="en-GB" sz="1600" b="1" dirty="0" smtClean="0">
+                    <a:latin typeface="Arial" panose="020B0604020202020204" pitchFamily="34" charset="0"/>
+                    <a:cs typeface="Arial" panose="020B0604020202020204" pitchFamily="34" charset="0"/>
+                  </a:endParaRPr>
+                </a:p>
+              </p:txBody>
+            </p:sp>
+            <p:cxnSp>
+              <p:nvCxnSpPr>
+                <p:cNvPr id="14" name="Straight Connector 13"/>
+                <p:cNvCxnSpPr>
+                  <a:stCxn id="6" idx="0"/>
+                  <a:endCxn id="6" idx="3"/>
+                </p:cNvCxnSpPr>
+                <p:nvPr/>
+              </p:nvCxnSpPr>
+              <p:spPr>
+                <a:xfrm rot="16200000" flipH="1">
+                  <a:off x="5417869" y="1756931"/>
+                  <a:ext cx="169277" cy="365645"/>
+                </a:xfrm>
+                <a:prstGeom prst="bentConnector4">
+                  <a:avLst>
+                    <a:gd name="adj1" fmla="val -135045"/>
+                    <a:gd name="adj2" fmla="val 162520"/>
+                  </a:avLst>
+                </a:prstGeom>
+                <a:ln w="19050">
+                  <a:solidFill>
+                    <a:schemeClr val="tx1"/>
+                  </a:solidFill>
+                </a:ln>
+                <a:effectLst>
+                  <a:outerShdw blurRad="50800" dist="38100" dir="2700000" algn="tl" rotWithShape="0">
+                    <a:prstClr val="black">
+                      <a:alpha val="40000"/>
+                    </a:prstClr>
+                  </a:outerShdw>
+                </a:effectLst>
+              </p:spPr>
+              <p:style>
+                <a:lnRef idx="1">
+                  <a:schemeClr val="accent1"/>
+                </a:lnRef>
+                <a:fillRef idx="0">
+                  <a:schemeClr val="accent1"/>
+                </a:fillRef>
+                <a:effectRef idx="0">
+                  <a:schemeClr val="accent1"/>
+                </a:effectRef>
+                <a:fontRef idx="minor">
+                  <a:schemeClr val="tx1"/>
+                </a:fontRef>
+              </p:style>
+            </p:cxnSp>
+            <p:cxnSp>
+              <p:nvCxnSpPr>
+                <p:cNvPr id="67" name="Straight Connector 13"/>
+                <p:cNvCxnSpPr>
+                  <a:stCxn id="4" idx="2"/>
+                  <a:endCxn id="6" idx="2"/>
+                </p:cNvCxnSpPr>
+                <p:nvPr/>
+              </p:nvCxnSpPr>
+              <p:spPr>
+                <a:xfrm rot="16200000" flipH="1">
+                  <a:off x="3148766" y="22749"/>
+                  <a:ext cx="1282" cy="4340557"/>
+                </a:xfrm>
+                <a:prstGeom prst="bentConnector3">
+                  <a:avLst>
+                    <a:gd name="adj1" fmla="val 17931513"/>
+                  </a:avLst>
+                </a:prstGeom>
+                <a:ln w="19050">
+                  <a:solidFill>
+                    <a:schemeClr val="tx1"/>
+                  </a:solidFill>
+                </a:ln>
+                <a:effectLst>
+                  <a:outerShdw blurRad="50800" dist="38100" dir="2700000" algn="tl" rotWithShape="0">
+                    <a:prstClr val="black">
+                      <a:alpha val="40000"/>
+                    </a:prstClr>
+                  </a:outerShdw>
+                </a:effectLst>
+              </p:spPr>
+              <p:style>
+                <a:lnRef idx="1">
+                  <a:schemeClr val="accent1"/>
+                </a:lnRef>
+                <a:fillRef idx="0">
+                  <a:schemeClr val="accent1"/>
+                </a:fillRef>
+                <a:effectRef idx="0">
+                  <a:schemeClr val="accent1"/>
+                </a:effectRef>
+                <a:fontRef idx="minor">
+                  <a:schemeClr val="tx1"/>
+                </a:fontRef>
+              </p:style>
+            </p:cxnSp>
+          </p:grpSp>
+          <p:sp>
+            <p:nvSpPr>
+              <p:cNvPr id="74" name="Rectangle 73"/>
+              <p:cNvSpPr/>
+              <p:nvPr/>
+            </p:nvSpPr>
+            <p:spPr>
+              <a:xfrm>
+                <a:off x="4171251" y="2001710"/>
+                <a:ext cx="782587" cy="307777"/>
+              </a:xfrm>
+              <a:prstGeom prst="rect">
+                <a:avLst/>
+              </a:prstGeom>
+              <a:noFill/>
+              <a:ln w="19050">
+                <a:noFill/>
+              </a:ln>
+              <a:effectLst/>
+            </p:spPr>
+            <p:style>
+              <a:lnRef idx="2">
+                <a:schemeClr val="dk1"/>
+              </a:lnRef>
+              <a:fillRef idx="1">
+                <a:schemeClr val="lt1"/>
+              </a:fillRef>
+              <a:effectRef idx="0">
+                <a:schemeClr val="dk1"/>
+              </a:effectRef>
+              <a:fontRef idx="minor">
+                <a:schemeClr val="dk1"/>
+              </a:fontRef>
+            </p:style>
+            <p:txBody>
+              <a:bodyPr wrap="none" rtlCol="0" anchor="ctr">
+                <a:spAutoFit/>
+              </a:bodyPr>
+              <a:lstStyle/>
+              <a:p>
+                <a:r>
+                  <a:rPr lang="en-GB" sz="1400" dirty="0" smtClean="0">
+                    <a:latin typeface="Arial" panose="020B0604020202020204" pitchFamily="34" charset="0"/>
+                    <a:cs typeface="Arial" panose="020B0604020202020204" pitchFamily="34" charset="0"/>
+                  </a:rPr>
+                  <a:t>classes</a:t>
+                </a:r>
+                <a:endParaRPr lang="en-GB" sz="1400" dirty="0">
+                  <a:latin typeface="Arial" panose="020B0604020202020204" pitchFamily="34" charset="0"/>
+                  <a:cs typeface="Arial" panose="020B0604020202020204" pitchFamily="34" charset="0"/>
+                </a:endParaRPr>
+              </a:p>
+            </p:txBody>
+          </p:sp>
+          <p:sp>
+            <p:nvSpPr>
+              <p:cNvPr id="75" name="Rectangle 74"/>
+              <p:cNvSpPr/>
+              <p:nvPr/>
+            </p:nvSpPr>
+            <p:spPr>
+              <a:xfrm>
+                <a:off x="1600003" y="2023110"/>
+                <a:ext cx="950901" cy="307777"/>
+              </a:xfrm>
+              <a:prstGeom prst="rect">
+                <a:avLst/>
+              </a:prstGeom>
+              <a:noFill/>
+              <a:ln w="19050">
+                <a:noFill/>
+              </a:ln>
+              <a:effectLst/>
+            </p:spPr>
+            <p:style>
+              <a:lnRef idx="2">
+                <a:schemeClr val="dk1"/>
+              </a:lnRef>
+              <a:fillRef idx="1">
+                <a:schemeClr val="lt1"/>
+              </a:fillRef>
+              <a:effectRef idx="0">
+                <a:schemeClr val="dk1"/>
+              </a:effectRef>
+              <a:fontRef idx="minor">
+                <a:schemeClr val="dk1"/>
+              </a:fontRef>
+            </p:style>
+            <p:txBody>
+              <a:bodyPr wrap="none" rtlCol="0" anchor="ctr">
+                <a:spAutoFit/>
+              </a:bodyPr>
+              <a:lstStyle/>
+              <a:p>
+                <a:r>
+                  <a:rPr lang="en-GB" sz="1400" dirty="0" smtClean="0">
+                    <a:latin typeface="Arial" panose="020B0604020202020204" pitchFamily="34" charset="0"/>
+                    <a:cs typeface="Arial" panose="020B0604020202020204" pitchFamily="34" charset="0"/>
+                  </a:rPr>
+                  <a:t>packages</a:t>
+                </a:r>
+                <a:endParaRPr lang="en-GB" sz="1400" dirty="0">
+                  <a:latin typeface="Arial" panose="020B0604020202020204" pitchFamily="34" charset="0"/>
+                  <a:cs typeface="Arial" panose="020B0604020202020204" pitchFamily="34" charset="0"/>
+                </a:endParaRPr>
+              </a:p>
+            </p:txBody>
+          </p:sp>
+          <p:sp>
+            <p:nvSpPr>
+              <p:cNvPr id="77" name="Rectangle 76"/>
+              <p:cNvSpPr/>
+              <p:nvPr/>
+            </p:nvSpPr>
+            <p:spPr>
+              <a:xfrm>
+                <a:off x="4537098" y="2435996"/>
+                <a:ext cx="782587" cy="307777"/>
+              </a:xfrm>
+              <a:prstGeom prst="rect">
+                <a:avLst/>
+              </a:prstGeom>
+              <a:noFill/>
+              <a:ln w="19050">
+                <a:noFill/>
+              </a:ln>
+              <a:effectLst/>
+            </p:spPr>
+            <p:style>
+              <a:lnRef idx="2">
+                <a:schemeClr val="dk1"/>
+              </a:lnRef>
+              <a:fillRef idx="1">
+                <a:schemeClr val="lt1"/>
+              </a:fillRef>
+              <a:effectRef idx="0">
+                <a:schemeClr val="dk1"/>
+              </a:effectRef>
+              <a:fontRef idx="minor">
+                <a:schemeClr val="dk1"/>
+              </a:fontRef>
+            </p:style>
+            <p:txBody>
+              <a:bodyPr wrap="none" rtlCol="0" anchor="ctr">
+                <a:spAutoFit/>
+              </a:bodyPr>
+              <a:lstStyle/>
+              <a:p>
+                <a:r>
+                  <a:rPr lang="en-GB" sz="1400" dirty="0" smtClean="0">
+                    <a:latin typeface="Arial" panose="020B0604020202020204" pitchFamily="34" charset="0"/>
+                    <a:cs typeface="Arial" panose="020B0604020202020204" pitchFamily="34" charset="0"/>
+                  </a:rPr>
+                  <a:t>classes</a:t>
+                </a:r>
+                <a:endParaRPr lang="en-GB" sz="1400" dirty="0">
+                  <a:latin typeface="Arial" panose="020B0604020202020204" pitchFamily="34" charset="0"/>
+                  <a:cs typeface="Arial" panose="020B0604020202020204" pitchFamily="34" charset="0"/>
+                </a:endParaRPr>
+              </a:p>
+            </p:txBody>
+          </p:sp>
+        </p:grpSp>
+        <p:sp>
+          <p:nvSpPr>
+            <p:cNvPr id="28" name="TextBox 27"/>
+            <p:cNvSpPr txBox="1"/>
+            <p:nvPr/>
+          </p:nvSpPr>
+          <p:spPr>
+            <a:xfrm>
+              <a:off x="2845168" y="3295579"/>
+              <a:ext cx="284052" cy="307777"/>
+            </a:xfrm>
+            <a:prstGeom prst="rect">
+              <a:avLst/>
+            </a:prstGeom>
+            <a:solidFill>
+              <a:schemeClr val="bg1"/>
+            </a:solidFill>
+            <a:ln w="12700">
+              <a:solidFill>
+                <a:schemeClr val="tx1"/>
+              </a:solidFill>
+              <a:prstDash val="dash"/>
+            </a:ln>
+          </p:spPr>
+          <p:txBody>
+            <a:bodyPr wrap="none" rtlCol="0">
+              <a:spAutoFit/>
+            </a:bodyPr>
+            <a:lstStyle/>
+            <a:p>
+              <a:r>
+                <a:rPr lang="en-GB" sz="1400" dirty="0" smtClean="0">
+                  <a:latin typeface="Arial" panose="020B0604020202020204" pitchFamily="34" charset="0"/>
+                  <a:cs typeface="Arial" panose="020B0604020202020204" pitchFamily="34" charset="0"/>
+                </a:rPr>
+                <a:t>0</a:t>
+              </a:r>
+              <a:endParaRPr lang="en-GB" sz="1400" dirty="0">
+                <a:latin typeface="Arial" panose="020B0604020202020204" pitchFamily="34" charset="0"/>
+                <a:cs typeface="Arial" panose="020B0604020202020204" pitchFamily="34" charset="0"/>
+              </a:endParaRPr>
+            </a:p>
+          </p:txBody>
+        </p:sp>
+        <p:sp>
+          <p:nvSpPr>
+            <p:cNvPr id="29" name="TextBox 28"/>
+            <p:cNvSpPr txBox="1"/>
+            <p:nvPr/>
+          </p:nvSpPr>
+          <p:spPr>
+            <a:xfrm>
+              <a:off x="4705044" y="3301034"/>
+              <a:ext cx="284052" cy="307777"/>
+            </a:xfrm>
+            <a:prstGeom prst="rect">
+              <a:avLst/>
+            </a:prstGeom>
+            <a:solidFill>
+              <a:schemeClr val="bg1"/>
+            </a:solidFill>
+            <a:ln w="12700">
+              <a:solidFill>
+                <a:schemeClr val="tx1"/>
+              </a:solidFill>
+              <a:prstDash val="dash"/>
+            </a:ln>
+          </p:spPr>
+          <p:txBody>
+            <a:bodyPr wrap="none" rtlCol="0">
+              <a:spAutoFit/>
+            </a:bodyPr>
+            <a:lstStyle/>
+            <a:p>
+              <a:r>
+                <a:rPr lang="en-GB" sz="1400" dirty="0">
+                  <a:latin typeface="Arial" panose="020B0604020202020204" pitchFamily="34" charset="0"/>
+                  <a:cs typeface="Arial" panose="020B0604020202020204" pitchFamily="34" charset="0"/>
+                </a:rPr>
+                <a:t>1</a:t>
+              </a:r>
+            </a:p>
+          </p:txBody>
+        </p:sp>
+        <p:sp>
+          <p:nvSpPr>
+            <p:cNvPr id="30" name="TextBox 29"/>
+            <p:cNvSpPr txBox="1"/>
+            <p:nvPr/>
+          </p:nvSpPr>
+          <p:spPr>
+            <a:xfrm>
+              <a:off x="7070820" y="3304607"/>
+              <a:ext cx="284052" cy="307777"/>
+            </a:xfrm>
+            <a:prstGeom prst="rect">
+              <a:avLst/>
+            </a:prstGeom>
+            <a:solidFill>
+              <a:schemeClr val="bg1"/>
+            </a:solidFill>
+            <a:ln w="12700">
+              <a:solidFill>
+                <a:schemeClr val="tx1"/>
+              </a:solidFill>
+              <a:prstDash val="dash"/>
+            </a:ln>
+          </p:spPr>
+          <p:txBody>
+            <a:bodyPr wrap="none" rtlCol="0">
+              <a:spAutoFit/>
+            </a:bodyPr>
+            <a:lstStyle/>
+            <a:p>
+              <a:r>
+                <a:rPr lang="en-GB" sz="1400" dirty="0">
+                  <a:latin typeface="Arial" panose="020B0604020202020204" pitchFamily="34" charset="0"/>
+                  <a:cs typeface="Arial" panose="020B0604020202020204" pitchFamily="34" charset="0"/>
+                </a:rPr>
+                <a:t>2</a:t>
+              </a:r>
+            </a:p>
+          </p:txBody>
+        </p:sp>
+        <p:sp>
+          <p:nvSpPr>
+            <p:cNvPr id="31" name="TextBox 30"/>
+            <p:cNvSpPr txBox="1"/>
+            <p:nvPr/>
+          </p:nvSpPr>
+          <p:spPr>
+            <a:xfrm>
+              <a:off x="3732919" y="3258219"/>
+              <a:ext cx="399431" cy="432792"/>
+            </a:xfrm>
+            <a:prstGeom prst="ellipse">
+              <a:avLst/>
+            </a:prstGeom>
+            <a:solidFill>
+              <a:schemeClr val="bg1"/>
+            </a:solidFill>
+            <a:ln w="12700">
+              <a:solidFill>
+                <a:schemeClr val="tx1"/>
+              </a:solidFill>
+              <a:prstDash val="dash"/>
+            </a:ln>
+          </p:spPr>
+          <p:txBody>
+            <a:bodyPr wrap="none" rtlCol="0">
+              <a:spAutoFit/>
+            </a:bodyPr>
+            <a:lstStyle/>
+            <a:p>
+              <a:r>
+                <a:rPr lang="en-GB" sz="1400" dirty="0" smtClean="0">
+                  <a:latin typeface="Arial" panose="020B0604020202020204" pitchFamily="34" charset="0"/>
+                  <a:cs typeface="Arial" panose="020B0604020202020204" pitchFamily="34" charset="0"/>
+                </a:rPr>
+                <a:t>0</a:t>
+              </a:r>
+              <a:endParaRPr lang="en-GB" sz="1400" dirty="0">
+                <a:latin typeface="Arial" panose="020B0604020202020204" pitchFamily="34" charset="0"/>
+                <a:cs typeface="Arial" panose="020B0604020202020204" pitchFamily="34" charset="0"/>
+              </a:endParaRPr>
+            </a:p>
+          </p:txBody>
+        </p:sp>
+        <p:sp>
+          <p:nvSpPr>
+            <p:cNvPr id="32" name="TextBox 31"/>
+            <p:cNvSpPr txBox="1"/>
+            <p:nvPr/>
+          </p:nvSpPr>
+          <p:spPr>
+            <a:xfrm>
+              <a:off x="5947679" y="3258219"/>
+              <a:ext cx="399431" cy="432792"/>
+            </a:xfrm>
+            <a:prstGeom prst="ellipse">
+              <a:avLst/>
+            </a:prstGeom>
+            <a:solidFill>
+              <a:schemeClr val="bg1"/>
+            </a:solidFill>
+            <a:ln w="12700">
+              <a:solidFill>
+                <a:schemeClr val="tx1"/>
+              </a:solidFill>
+              <a:prstDash val="dash"/>
+            </a:ln>
+          </p:spPr>
+          <p:txBody>
+            <a:bodyPr wrap="none" rtlCol="0">
+              <a:spAutoFit/>
+            </a:bodyPr>
+            <a:lstStyle/>
+            <a:p>
+              <a:r>
+                <a:rPr lang="en-GB" sz="1400" dirty="0" smtClean="0">
+                  <a:latin typeface="Arial" panose="020B0604020202020204" pitchFamily="34" charset="0"/>
+                  <a:cs typeface="Arial" panose="020B0604020202020204" pitchFamily="34" charset="0"/>
+                </a:rPr>
+                <a:t>0</a:t>
+              </a:r>
+              <a:endParaRPr lang="en-GB" sz="1400" dirty="0">
+                <a:latin typeface="Arial" panose="020B0604020202020204" pitchFamily="34" charset="0"/>
+                <a:cs typeface="Arial" panose="020B0604020202020204" pitchFamily="34" charset="0"/>
+              </a:endParaRPr>
+            </a:p>
+          </p:txBody>
+        </p:sp>
+        <p:sp>
+          <p:nvSpPr>
+            <p:cNvPr id="35" name="TextBox 34"/>
+            <p:cNvSpPr txBox="1"/>
+            <p:nvPr/>
+          </p:nvSpPr>
+          <p:spPr>
+            <a:xfrm>
+              <a:off x="8340718" y="3304607"/>
+              <a:ext cx="399431" cy="432792"/>
+            </a:xfrm>
+            <a:prstGeom prst="ellipse">
+              <a:avLst/>
+            </a:prstGeom>
+            <a:solidFill>
+              <a:schemeClr val="bg1"/>
+            </a:solidFill>
+            <a:ln w="12700">
+              <a:solidFill>
+                <a:schemeClr val="tx1"/>
+              </a:solidFill>
+              <a:prstDash val="dash"/>
+            </a:ln>
+          </p:spPr>
+          <p:txBody>
+            <a:bodyPr wrap="none" rtlCol="0">
+              <a:spAutoFit/>
+            </a:bodyPr>
+            <a:lstStyle/>
+            <a:p>
+              <a:r>
+                <a:rPr lang="en-GB" sz="1400" dirty="0" smtClean="0">
+                  <a:latin typeface="Arial" panose="020B0604020202020204" pitchFamily="34" charset="0"/>
+                  <a:cs typeface="Arial" panose="020B0604020202020204" pitchFamily="34" charset="0"/>
+                </a:rPr>
+                <a:t>0</a:t>
+              </a:r>
+              <a:endParaRPr lang="en-GB" sz="1400" dirty="0">
+                <a:latin typeface="Arial" panose="020B0604020202020204" pitchFamily="34" charset="0"/>
+                <a:cs typeface="Arial" panose="020B0604020202020204" pitchFamily="34" charset="0"/>
+              </a:endParaRPr>
+            </a:p>
+          </p:txBody>
+        </p:sp>
+        <p:sp>
+          <p:nvSpPr>
+            <p:cNvPr id="71" name="TextBox 70"/>
+            <p:cNvSpPr txBox="1"/>
+            <p:nvPr/>
+          </p:nvSpPr>
+          <p:spPr>
+            <a:xfrm>
+              <a:off x="3282195" y="4147400"/>
+              <a:ext cx="399431" cy="432792"/>
+            </a:xfrm>
+            <a:prstGeom prst="ellipse">
+              <a:avLst/>
+            </a:prstGeom>
+            <a:solidFill>
+              <a:schemeClr val="bg1"/>
+            </a:solidFill>
+            <a:ln w="12700">
+              <a:solidFill>
+                <a:schemeClr val="tx1"/>
+              </a:solidFill>
+              <a:prstDash val="dash"/>
+            </a:ln>
+          </p:spPr>
+          <p:txBody>
+            <a:bodyPr wrap="none" rtlCol="0">
+              <a:spAutoFit/>
+            </a:bodyPr>
+            <a:lstStyle/>
+            <a:p>
+              <a:r>
+                <a:rPr lang="en-GB" sz="1400" dirty="0">
+                  <a:latin typeface="Arial" panose="020B0604020202020204" pitchFamily="34" charset="0"/>
+                  <a:cs typeface="Arial" panose="020B0604020202020204" pitchFamily="34" charset="0"/>
+                </a:rPr>
+                <a:t>1</a:t>
+              </a:r>
+              <a:endParaRPr lang="en-GB" sz="1400" dirty="0">
+                <a:latin typeface="Arial" panose="020B0604020202020204" pitchFamily="34" charset="0"/>
+                <a:cs typeface="Arial" panose="020B0604020202020204" pitchFamily="34" charset="0"/>
+              </a:endParaRPr>
+            </a:p>
+          </p:txBody>
+        </p:sp>
+      </p:grpSp>
+      <p:sp>
+        <p:nvSpPr>
+          <p:cNvPr id="78" name="Rounded Rectangle 77"/>
           <p:cNvSpPr/>
           <p:nvPr/>
         </p:nvSpPr>
         <p:spPr>
           <a:xfrm>
-            <a:off x="890646" y="3304756"/>
-            <a:ext cx="766653" cy="374571"/>
+            <a:off x="744316" y="3304756"/>
+            <a:ext cx="1059317" cy="374571"/>
           </a:xfrm>
           <a:prstGeom prst="roundRect">
             <a:avLst/>
@@ -4032,7 +8077,7 @@
                 <a:latin typeface="Arial" panose="020B0604020202020204" pitchFamily="34" charset="0"/>
                 <a:cs typeface="Arial" panose="020B0604020202020204" pitchFamily="34" charset="0"/>
               </a:rPr>
-              <a:t>z:Zoo</a:t>
+              <a:t>m:Model</a:t>
             </a:r>
             <a:endParaRPr lang="en-GB" sz="1600" b="1" dirty="0">
               <a:latin typeface="Arial" panose="020B0604020202020204" pitchFamily="34" charset="0"/>
@@ -4043,17 +8088,17 @@
       </p:sp>
       <p:cxnSp>
         <p:nvCxnSpPr>
-          <p:cNvPr id="52" name="Straight Connector 51"/>
+          <p:cNvPr id="79" name="Straight Connector 78"/>
           <p:cNvCxnSpPr>
-            <a:stCxn id="63" idx="3"/>
-            <a:endCxn id="60" idx="1"/>
+            <a:stCxn id="78" idx="3"/>
+            <a:endCxn id="106" idx="1"/>
           </p:cNvCxnSpPr>
           <p:nvPr/>
         </p:nvCxnSpPr>
         <p:spPr>
           <a:xfrm>
-            <a:off x="1657299" y="3492042"/>
-            <a:ext cx="756378" cy="0"/>
+            <a:off x="1803633" y="3492042"/>
+            <a:ext cx="946133" cy="0"/>
           </a:xfrm>
           <a:prstGeom prst="line">
             <a:avLst/>
@@ -4088,17 +8133,17 @@
       </p:cxnSp>
       <p:cxnSp>
         <p:nvCxnSpPr>
-          <p:cNvPr id="53" name="Straight Connector 52"/>
+          <p:cNvPr id="81" name="Straight Connector 80"/>
           <p:cNvCxnSpPr>
-            <a:stCxn id="60" idx="3"/>
-            <a:endCxn id="57" idx="1"/>
+            <a:stCxn id="106" idx="3"/>
+            <a:endCxn id="109" idx="1"/>
           </p:cNvCxnSpPr>
           <p:nvPr/>
         </p:nvCxnSpPr>
         <p:spPr>
           <a:xfrm>
-            <a:off x="4551889" y="3492042"/>
-            <a:ext cx="862857" cy="1282"/>
+            <a:off x="4215799" y="3492042"/>
+            <a:ext cx="1198947" cy="1282"/>
           </a:xfrm>
           <a:prstGeom prst="line">
             <a:avLst/>
@@ -4131,150 +8176,81 @@
           </a:fontRef>
         </p:style>
       </p:cxnSp>
+      <p:sp>
+        <p:nvSpPr>
+          <p:cNvPr id="106" name="Rounded Rectangle 105"/>
+          <p:cNvSpPr/>
+          <p:nvPr/>
+        </p:nvSpPr>
+        <p:spPr>
+          <a:xfrm>
+            <a:off x="2749766" y="3304756"/>
+            <a:ext cx="1466033" cy="374571"/>
+          </a:xfrm>
+          <a:prstGeom prst="roundRect">
+            <a:avLst/>
+          </a:prstGeom>
+          <a:ln w="19050"/>
+          <a:effectLst>
+            <a:outerShdw blurRad="50800" dist="38100" dir="2700000" algn="tl" rotWithShape="0">
+              <a:prstClr val="black">
+                <a:alpha val="40000"/>
+              </a:prstClr>
+            </a:outerShdw>
+          </a:effectLst>
+        </p:spPr>
+        <p:style>
+          <a:lnRef idx="2">
+            <a:schemeClr val="dk1"/>
+          </a:lnRef>
+          <a:fillRef idx="1">
+            <a:schemeClr val="lt1"/>
+          </a:fillRef>
+          <a:effectRef idx="0">
+            <a:schemeClr val="dk1"/>
+          </a:effectRef>
+          <a:fontRef idx="minor">
+            <a:schemeClr val="dk1"/>
+          </a:fontRef>
+        </p:style>
+        <p:txBody>
+          <a:bodyPr wrap="none" rtlCol="0" anchor="ctr">
+            <a:spAutoFit/>
+          </a:bodyPr>
+          <a:lstStyle/>
+          <a:p>
+            <a:pPr algn="ctr"/>
+            <a:r>
+              <a:rPr lang="en-GB" sz="1600" b="1" dirty="0" smtClean="0">
+                <a:latin typeface="Arial" panose="020B0604020202020204" pitchFamily="34" charset="0"/>
+                <a:cs typeface="Arial" panose="020B0604020202020204" pitchFamily="34" charset="0"/>
+              </a:rPr>
+              <a:t>p1 </a:t>
+            </a:r>
+            <a:r>
+              <a:rPr lang="en-GB" sz="1600" b="1" dirty="0" smtClean="0">
+                <a:latin typeface="Arial" panose="020B0604020202020204" pitchFamily="34" charset="0"/>
+                <a:cs typeface="Arial" panose="020B0604020202020204" pitchFamily="34" charset="0"/>
+              </a:rPr>
+              <a:t>: </a:t>
+            </a:r>
+            <a:r>
+              <a:rPr lang="en-GB" sz="1600" b="1" dirty="0" smtClean="0">
+                <a:latin typeface="Arial" panose="020B0604020202020204" pitchFamily="34" charset="0"/>
+                <a:cs typeface="Arial" panose="020B0604020202020204" pitchFamily="34" charset="0"/>
+              </a:rPr>
+              <a:t>Package</a:t>
+            </a:r>
+            <a:endParaRPr lang="en-GB" sz="1600" b="1" dirty="0" smtClean="0">
+              <a:latin typeface="Arial" panose="020B0604020202020204" pitchFamily="34" charset="0"/>
+              <a:cs typeface="Arial" panose="020B0604020202020204" pitchFamily="34" charset="0"/>
+            </a:endParaRPr>
+          </a:p>
+        </p:txBody>
+      </p:sp>
       <p:grpSp>
         <p:nvGrpSpPr>
-          <p:cNvPr id="55" name="Group 54"/>
-          <p:cNvGrpSpPr/>
-          <p:nvPr/>
-        </p:nvGrpSpPr>
-        <p:grpSpPr>
-          <a:xfrm>
-            <a:off x="2413677" y="3032341"/>
-            <a:ext cx="2138212" cy="919401"/>
-            <a:chOff x="2000083" y="1563410"/>
-            <a:chExt cx="2138212" cy="919401"/>
-          </a:xfrm>
-        </p:grpSpPr>
-        <p:sp>
-          <p:nvSpPr>
-            <p:cNvPr id="60" name="Rounded Rectangle 59"/>
-            <p:cNvSpPr/>
-            <p:nvPr/>
-          </p:nvSpPr>
-          <p:spPr>
-            <a:xfrm>
-              <a:off x="2000083" y="1563410"/>
-              <a:ext cx="2138212" cy="919401"/>
-            </a:xfrm>
-            <a:prstGeom prst="roundRect">
-              <a:avLst/>
-            </a:prstGeom>
-            <a:ln w="19050"/>
-            <a:effectLst>
-              <a:outerShdw blurRad="50800" dist="38100" dir="2700000" algn="tl" rotWithShape="0">
-                <a:prstClr val="black">
-                  <a:alpha val="40000"/>
-                </a:prstClr>
-              </a:outerShdw>
-            </a:effectLst>
-          </p:spPr>
-          <p:style>
-            <a:lnRef idx="2">
-              <a:schemeClr val="dk1"/>
-            </a:lnRef>
-            <a:fillRef idx="1">
-              <a:schemeClr val="lt1"/>
-            </a:fillRef>
-            <a:effectRef idx="0">
-              <a:schemeClr val="dk1"/>
-            </a:effectRef>
-            <a:fontRef idx="minor">
-              <a:schemeClr val="dk1"/>
-            </a:fontRef>
-          </p:style>
-          <p:txBody>
-            <a:bodyPr wrap="none" rtlCol="0" anchor="ctr">
-              <a:spAutoFit/>
-            </a:bodyPr>
-            <a:lstStyle/>
-            <a:p>
-              <a:pPr algn="ctr"/>
-              <a:r>
-                <a:rPr lang="en-GB" sz="1600" b="1" dirty="0" smtClean="0">
-                  <a:latin typeface="Arial" panose="020B0604020202020204" pitchFamily="34" charset="0"/>
-                  <a:cs typeface="Arial" panose="020B0604020202020204" pitchFamily="34" charset="0"/>
-                </a:rPr>
-                <a:t>c1 : Cage</a:t>
-              </a:r>
-            </a:p>
-            <a:p>
-              <a:r>
-                <a:rPr lang="en-GB" sz="1600" dirty="0" err="1" smtClean="0">
-                  <a:latin typeface="Arial" panose="020B0604020202020204" pitchFamily="34" charset="0"/>
-                  <a:cs typeface="Arial" panose="020B0604020202020204" pitchFamily="34" charset="0"/>
-                </a:rPr>
-                <a:t>totalSpace</a:t>
-              </a:r>
-              <a:r>
-                <a:rPr lang="en-GB" sz="1600" dirty="0" smtClean="0">
-                  <a:latin typeface="Arial" panose="020B0604020202020204" pitchFamily="34" charset="0"/>
-                  <a:cs typeface="Arial" panose="020B0604020202020204" pitchFamily="34" charset="0"/>
-                </a:rPr>
-                <a:t> = 5</a:t>
-              </a:r>
-            </a:p>
-            <a:p>
-              <a:r>
-                <a:rPr lang="en-GB" sz="1600" dirty="0" err="1" smtClean="0">
-                  <a:latin typeface="Arial" panose="020B0604020202020204" pitchFamily="34" charset="0"/>
-                  <a:cs typeface="Arial" panose="020B0604020202020204" pitchFamily="34" charset="0"/>
-                </a:rPr>
-                <a:t>spaceRemaining</a:t>
-              </a:r>
-              <a:r>
-                <a:rPr lang="en-GB" sz="1600" dirty="0" smtClean="0">
-                  <a:latin typeface="Arial" panose="020B0604020202020204" pitchFamily="34" charset="0"/>
-                  <a:cs typeface="Arial" panose="020B0604020202020204" pitchFamily="34" charset="0"/>
-                </a:rPr>
-                <a:t> = 3</a:t>
-              </a:r>
-              <a:endParaRPr lang="en-GB" sz="1600" dirty="0">
-                <a:latin typeface="Arial" panose="020B0604020202020204" pitchFamily="34" charset="0"/>
-                <a:cs typeface="Arial" panose="020B0604020202020204" pitchFamily="34" charset="0"/>
-              </a:endParaRPr>
-            </a:p>
-          </p:txBody>
-        </p:sp>
-        <p:cxnSp>
-          <p:nvCxnSpPr>
-            <p:cNvPr id="62" name="Straight Connector 61"/>
-            <p:cNvCxnSpPr/>
-            <p:nvPr/>
-          </p:nvCxnSpPr>
-          <p:spPr>
-            <a:xfrm>
-              <a:off x="2019863" y="1917518"/>
-              <a:ext cx="2098651" cy="0"/>
-            </a:xfrm>
-            <a:prstGeom prst="line">
-              <a:avLst/>
-            </a:prstGeom>
-            <a:ln w="19050">
-              <a:solidFill>
-                <a:schemeClr val="tx1"/>
-              </a:solidFill>
-            </a:ln>
-            <a:effectLst/>
-          </p:spPr>
-          <p:style>
-            <a:lnRef idx="1">
-              <a:schemeClr val="accent1"/>
-            </a:lnRef>
-            <a:fillRef idx="0">
-              <a:schemeClr val="accent1"/>
-            </a:fillRef>
-            <a:effectRef idx="0">
-              <a:schemeClr val="accent1"/>
-            </a:effectRef>
-            <a:fontRef idx="minor">
-              <a:schemeClr val="tx1"/>
-            </a:fontRef>
-          </p:style>
-        </p:cxnSp>
-      </p:grpSp>
-      <p:grpSp>
-        <p:nvGrpSpPr>
-          <p:cNvPr id="56" name="Group 55"/>
+          <p:cNvPr id="108" name="Group 107"/>
           <p:cNvGrpSpPr/>
           <p:nvPr/>
         </p:nvGrpSpPr>
@@ -4288,7 +8264,7 @@
         </p:grpSpPr>
         <p:sp>
           <p:nvSpPr>
-            <p:cNvPr id="57" name="Rounded Rectangle 56"/>
+            <p:cNvPr id="109" name="Rounded Rectangle 108"/>
             <p:cNvSpPr/>
             <p:nvPr/>
           </p:nvSpPr>
@@ -4371,7 +8347,7 @@
         </p:sp>
         <p:cxnSp>
           <p:nvCxnSpPr>
-            <p:cNvPr id="59" name="Straight Connector 58"/>
+            <p:cNvPr id="110" name="Straight Connector 109"/>
             <p:cNvCxnSpPr/>
             <p:nvPr/>
           </p:nvCxnSpPr>
@@ -4408,7 +8384,7 @@
       </p:grpSp>
       <p:grpSp>
         <p:nvGrpSpPr>
-          <p:cNvPr id="65" name="Group 64"/>
+          <p:cNvPr id="111" name="Group 110"/>
           <p:cNvGrpSpPr/>
           <p:nvPr/>
         </p:nvGrpSpPr>
@@ -4422,7 +8398,7 @@
         </p:grpSpPr>
         <p:sp>
           <p:nvSpPr>
-            <p:cNvPr id="66" name="Rounded Rectangle 65"/>
+            <p:cNvPr id="112" name="Rounded Rectangle 111"/>
             <p:cNvSpPr/>
             <p:nvPr/>
           </p:nvSpPr>
@@ -4512,7 +8488,7 @@
         </p:sp>
         <p:cxnSp>
           <p:nvCxnSpPr>
-            <p:cNvPr id="68" name="Straight Connector 67"/>
+            <p:cNvPr id="113" name="Straight Connector 112"/>
             <p:cNvCxnSpPr/>
             <p:nvPr/>
           </p:nvCxnSpPr>
@@ -4549,7 +8525,7 @@
       </p:grpSp>
       <p:grpSp>
         <p:nvGrpSpPr>
-          <p:cNvPr id="69" name="Group 68"/>
+          <p:cNvPr id="114" name="Group 113"/>
           <p:cNvGrpSpPr/>
           <p:nvPr/>
         </p:nvGrpSpPr>
@@ -4563,7 +8539,7 @@
         </p:grpSpPr>
         <p:sp>
           <p:nvSpPr>
-            <p:cNvPr id="70" name="Rounded Rectangle 69"/>
+            <p:cNvPr id="115" name="Rounded Rectangle 114"/>
             <p:cNvSpPr/>
             <p:nvPr/>
           </p:nvSpPr>
@@ -4646,7 +8622,7 @@
         </p:sp>
         <p:cxnSp>
           <p:nvCxnSpPr>
-            <p:cNvPr id="72" name="Straight Connector 71"/>
+            <p:cNvPr id="116" name="Straight Connector 115"/>
             <p:cNvCxnSpPr/>
             <p:nvPr/>
           </p:nvCxnSpPr>
@@ -4683,10 +8659,10 @@
       </p:grpSp>
       <p:cxnSp>
         <p:nvCxnSpPr>
-          <p:cNvPr id="73" name="Straight Connector 72"/>
+          <p:cNvPr id="117" name="Straight Connector 116"/>
           <p:cNvCxnSpPr>
-            <a:stCxn id="66" idx="3"/>
-            <a:endCxn id="70" idx="1"/>
+            <a:stCxn id="112" idx="3"/>
+            <a:endCxn id="115" idx="1"/>
           </p:cNvCxnSpPr>
           <p:nvPr/>
         </p:nvCxnSpPr>
@@ -4728,17 +8704,17 @@
       </p:cxnSp>
       <p:cxnSp>
         <p:nvCxnSpPr>
-          <p:cNvPr id="76" name="Straight Connector 13"/>
+          <p:cNvPr id="118" name="Straight Connector 13"/>
           <p:cNvCxnSpPr>
-            <a:stCxn id="63" idx="3"/>
-            <a:endCxn id="66" idx="1"/>
+            <a:stCxn id="78" idx="3"/>
+            <a:endCxn id="112" idx="1"/>
           </p:cNvCxnSpPr>
           <p:nvPr/>
         </p:nvCxnSpPr>
         <p:spPr>
           <a:xfrm>
-            <a:off x="1657299" y="3492042"/>
-            <a:ext cx="735565" cy="1365741"/>
+            <a:off x="1803633" y="3492042"/>
+            <a:ext cx="589231" cy="1365741"/>
           </a:xfrm>
           <a:prstGeom prst="bentConnector3">
             <a:avLst>
@@ -4775,7 +8751,7 @@
       </p:cxnSp>
       <p:grpSp>
         <p:nvGrpSpPr>
-          <p:cNvPr id="104" name="Group 103"/>
+          <p:cNvPr id="119" name="Group 118"/>
           <p:cNvGrpSpPr/>
           <p:nvPr/>
         </p:nvGrpSpPr>
@@ -4789,7 +8765,7 @@
         </p:grpSpPr>
         <p:grpSp>
           <p:nvGrpSpPr>
-            <p:cNvPr id="98" name="Group 97"/>
+            <p:cNvPr id="120" name="Group 119"/>
             <p:cNvGrpSpPr/>
             <p:nvPr/>
           </p:nvGrpSpPr>
@@ -4803,7 +8779,7 @@
           </p:grpSpPr>
           <p:sp>
             <p:nvSpPr>
-              <p:cNvPr id="80" name="TextBox 79"/>
+              <p:cNvPr id="126" name="TextBox 125"/>
               <p:cNvSpPr txBox="1"/>
               <p:nvPr/>
             </p:nvSpPr>
@@ -4854,7 +8830,7 @@
           </p:sp>
           <p:cxnSp>
             <p:nvCxnSpPr>
-              <p:cNvPr id="82" name="Straight Connector 81"/>
+              <p:cNvPr id="127" name="Straight Connector 126"/>
               <p:cNvCxnSpPr/>
               <p:nvPr/>
             </p:nvCxnSpPr>
@@ -4889,7 +8865,7 @@
           </p:cxnSp>
           <p:cxnSp>
             <p:nvCxnSpPr>
-              <p:cNvPr id="83" name="Straight Connector 82"/>
+              <p:cNvPr id="128" name="Straight Connector 127"/>
               <p:cNvCxnSpPr/>
               <p:nvPr/>
             </p:nvCxnSpPr>
@@ -4924,7 +8900,7 @@
           </p:cxnSp>
           <p:cxnSp>
             <p:nvCxnSpPr>
-              <p:cNvPr id="84" name="Straight Connector 83"/>
+              <p:cNvPr id="129" name="Straight Connector 128"/>
               <p:cNvCxnSpPr/>
               <p:nvPr/>
             </p:nvCxnSpPr>
@@ -4959,7 +8935,7 @@
           </p:cxnSp>
           <p:cxnSp>
             <p:nvCxnSpPr>
-              <p:cNvPr id="85" name="Straight Connector 84"/>
+              <p:cNvPr id="130" name="Straight Connector 129"/>
               <p:cNvCxnSpPr/>
               <p:nvPr/>
             </p:nvCxnSpPr>
@@ -4994,7 +8970,7 @@
           </p:cxnSp>
           <p:cxnSp>
             <p:nvCxnSpPr>
-              <p:cNvPr id="86" name="Straight Connector 85"/>
+              <p:cNvPr id="131" name="Straight Connector 130"/>
               <p:cNvCxnSpPr/>
               <p:nvPr/>
             </p:nvCxnSpPr>
@@ -5030,7 +9006,7 @@
           </p:cxnSp>
           <p:cxnSp>
             <p:nvCxnSpPr>
-              <p:cNvPr id="87" name="Straight Connector 86"/>
+              <p:cNvPr id="132" name="Straight Connector 131"/>
               <p:cNvCxnSpPr/>
               <p:nvPr/>
             </p:nvCxnSpPr>
@@ -5066,7 +9042,7 @@
           </p:cxnSp>
           <p:cxnSp>
             <p:nvCxnSpPr>
-              <p:cNvPr id="88" name="Straight Connector 87"/>
+              <p:cNvPr id="133" name="Straight Connector 132"/>
               <p:cNvCxnSpPr/>
               <p:nvPr/>
             </p:nvCxnSpPr>
@@ -5102,7 +9078,7 @@
           </p:cxnSp>
           <p:cxnSp>
             <p:nvCxnSpPr>
-              <p:cNvPr id="89" name="Straight Connector 88"/>
+              <p:cNvPr id="134" name="Straight Connector 133"/>
               <p:cNvCxnSpPr/>
               <p:nvPr/>
             </p:nvCxnSpPr>
@@ -5138,7 +9114,7 @@
           </p:cxnSp>
           <p:cxnSp>
             <p:nvCxnSpPr>
-              <p:cNvPr id="90" name="Straight Connector 89"/>
+              <p:cNvPr id="135" name="Straight Connector 134"/>
               <p:cNvCxnSpPr/>
               <p:nvPr/>
             </p:nvCxnSpPr>
@@ -5174,7 +9150,7 @@
           </p:cxnSp>
           <p:cxnSp>
             <p:nvCxnSpPr>
-              <p:cNvPr id="91" name="Straight Connector 90"/>
+              <p:cNvPr id="136" name="Straight Connector 135"/>
               <p:cNvCxnSpPr/>
               <p:nvPr/>
             </p:nvCxnSpPr>
@@ -5210,7 +9186,7 @@
           </p:cxnSp>
           <p:cxnSp>
             <p:nvCxnSpPr>
-              <p:cNvPr id="92" name="Straight Connector 91"/>
+              <p:cNvPr id="137" name="Straight Connector 136"/>
               <p:cNvCxnSpPr/>
               <p:nvPr/>
             </p:nvCxnSpPr>
@@ -5246,7 +9222,7 @@
           </p:cxnSp>
           <p:cxnSp>
             <p:nvCxnSpPr>
-              <p:cNvPr id="93" name="Straight Connector 92"/>
+              <p:cNvPr id="138" name="Straight Connector 137"/>
               <p:cNvCxnSpPr/>
               <p:nvPr/>
             </p:nvCxnSpPr>
@@ -5282,7 +9258,7 @@
           </p:cxnSp>
           <p:cxnSp>
             <p:nvCxnSpPr>
-              <p:cNvPr id="94" name="Straight Connector 93"/>
+              <p:cNvPr id="139" name="Straight Connector 138"/>
               <p:cNvCxnSpPr/>
               <p:nvPr/>
             </p:nvCxnSpPr>
@@ -5318,7 +9294,7 @@
           </p:cxnSp>
           <p:cxnSp>
             <p:nvCxnSpPr>
-              <p:cNvPr id="95" name="Straight Connector 94"/>
+              <p:cNvPr id="140" name="Straight Connector 139"/>
               <p:cNvCxnSpPr/>
               <p:nvPr/>
             </p:nvCxnSpPr>
@@ -5354,7 +9330,7 @@
           </p:cxnSp>
           <p:cxnSp>
             <p:nvCxnSpPr>
-              <p:cNvPr id="96" name="Straight Connector 95"/>
+              <p:cNvPr id="141" name="Straight Connector 140"/>
               <p:cNvCxnSpPr/>
               <p:nvPr/>
             </p:nvCxnSpPr>
@@ -5390,7 +9366,7 @@
           </p:cxnSp>
           <p:cxnSp>
             <p:nvCxnSpPr>
-              <p:cNvPr id="97" name="Straight Connector 96"/>
+              <p:cNvPr id="142" name="Straight Connector 141"/>
               <p:cNvCxnSpPr/>
               <p:nvPr/>
             </p:nvCxnSpPr>
@@ -5427,7 +9403,7 @@
         </p:grpSp>
         <p:sp>
           <p:nvSpPr>
-            <p:cNvPr id="99" name="TextBox 98"/>
+            <p:cNvPr id="121" name="TextBox 120"/>
             <p:cNvSpPr txBox="1"/>
             <p:nvPr/>
           </p:nvSpPr>
@@ -5464,7 +9440,7 @@
         </p:sp>
         <p:sp>
           <p:nvSpPr>
-            <p:cNvPr id="100" name="TextBox 99"/>
+            <p:cNvPr id="122" name="TextBox 121"/>
             <p:cNvSpPr txBox="1"/>
             <p:nvPr/>
           </p:nvSpPr>
@@ -5501,7 +9477,7 @@
         </p:sp>
         <p:sp>
           <p:nvSpPr>
-            <p:cNvPr id="101" name="TextBox 100"/>
+            <p:cNvPr id="123" name="TextBox 122"/>
             <p:cNvSpPr txBox="1"/>
             <p:nvPr/>
           </p:nvSpPr>
@@ -5538,7 +9514,7 @@
         </p:sp>
         <p:sp>
           <p:nvSpPr>
-            <p:cNvPr id="102" name="TextBox 101"/>
+            <p:cNvPr id="124" name="TextBox 123"/>
             <p:cNvSpPr txBox="1"/>
             <p:nvPr/>
           </p:nvSpPr>
@@ -5575,7 +9551,7 @@
         </p:sp>
         <p:sp>
           <p:nvSpPr>
-            <p:cNvPr id="103" name="TextBox 102"/>
+            <p:cNvPr id="125" name="TextBox 124"/>
             <p:cNvSpPr txBox="1"/>
             <p:nvPr/>
           </p:nvSpPr>
@@ -5614,7 +9590,7 @@
     </p:spTree>
     <p:extLst>
       <p:ext uri="{BB962C8B-B14F-4D97-AF65-F5344CB8AC3E}">
-        <p14:creationId xmlns:p14="http://schemas.microsoft.com/office/powerpoint/2010/main" val="1512510430"/>
+        <p14:creationId xmlns:p14="http://schemas.microsoft.com/office/powerpoint/2010/main" val="304650944"/>
       </p:ext>
     </p:extLst>
   </p:cSld>

</xml_diff>